<commit_message>
Updated BCSApologetics to the latest version. Added a References Section
</commit_message>
<xml_diff>
--- a/BCSApologetics/RealApologetics.pptx
+++ b/BCSApologetics/RealApologetics.pptx
@@ -5,7 +5,7 @@
     <p:sldMasterId id="2147483960" r:id="rId1"/>
   </p:sldMasterIdLst>
   <p:notesMasterIdLst>
-    <p:notesMasterId r:id="rId27"/>
+    <p:notesMasterId r:id="rId37"/>
   </p:notesMasterIdLst>
   <p:sldIdLst>
     <p:sldId id="256" r:id="rId2"/>
@@ -17,22 +17,32 @@
     <p:sldId id="263" r:id="rId8"/>
     <p:sldId id="264" r:id="rId9"/>
     <p:sldId id="265" r:id="rId10"/>
-    <p:sldId id="266" r:id="rId11"/>
-    <p:sldId id="267" r:id="rId12"/>
-    <p:sldId id="268" r:id="rId13"/>
-    <p:sldId id="269" r:id="rId14"/>
-    <p:sldId id="270" r:id="rId15"/>
-    <p:sldId id="278" r:id="rId16"/>
-    <p:sldId id="279" r:id="rId17"/>
-    <p:sldId id="280" r:id="rId18"/>
-    <p:sldId id="271" r:id="rId19"/>
-    <p:sldId id="272" r:id="rId20"/>
-    <p:sldId id="273" r:id="rId21"/>
-    <p:sldId id="274" r:id="rId22"/>
-    <p:sldId id="275" r:id="rId23"/>
-    <p:sldId id="276" r:id="rId24"/>
-    <p:sldId id="277" r:id="rId25"/>
-    <p:sldId id="281" r:id="rId26"/>
+    <p:sldId id="283" r:id="rId11"/>
+    <p:sldId id="286" r:id="rId12"/>
+    <p:sldId id="287" r:id="rId13"/>
+    <p:sldId id="284" r:id="rId14"/>
+    <p:sldId id="288" r:id="rId15"/>
+    <p:sldId id="285" r:id="rId16"/>
+    <p:sldId id="289" r:id="rId17"/>
+    <p:sldId id="266" r:id="rId18"/>
+    <p:sldId id="267" r:id="rId19"/>
+    <p:sldId id="268" r:id="rId20"/>
+    <p:sldId id="269" r:id="rId21"/>
+    <p:sldId id="270" r:id="rId22"/>
+    <p:sldId id="278" r:id="rId23"/>
+    <p:sldId id="279" r:id="rId24"/>
+    <p:sldId id="280" r:id="rId25"/>
+    <p:sldId id="271" r:id="rId26"/>
+    <p:sldId id="272" r:id="rId27"/>
+    <p:sldId id="273" r:id="rId28"/>
+    <p:sldId id="274" r:id="rId29"/>
+    <p:sldId id="275" r:id="rId30"/>
+    <p:sldId id="276" r:id="rId31"/>
+    <p:sldId id="277" r:id="rId32"/>
+    <p:sldId id="282" r:id="rId33"/>
+    <p:sldId id="281" r:id="rId34"/>
+    <p:sldId id="290" r:id="rId35"/>
+    <p:sldId id="291" r:id="rId36"/>
   </p:sldIdLst>
   <p:sldSz cx="9144000" cy="6858000" type="screen4x3"/>
   <p:notesSz cx="6858000" cy="9144000"/>
@@ -145,6 +155,13 @@
             <p14:sldId id="263"/>
             <p14:sldId id="264"/>
             <p14:sldId id="265"/>
+            <p14:sldId id="283"/>
+            <p14:sldId id="286"/>
+            <p14:sldId id="287"/>
+            <p14:sldId id="284"/>
+            <p14:sldId id="288"/>
+            <p14:sldId id="285"/>
+            <p14:sldId id="289"/>
             <p14:sldId id="266"/>
             <p14:sldId id="267"/>
             <p14:sldId id="268"/>
@@ -160,7 +177,10 @@
             <p14:sldId id="275"/>
             <p14:sldId id="276"/>
             <p14:sldId id="277"/>
+            <p14:sldId id="282"/>
             <p14:sldId id="281"/>
+            <p14:sldId id="290"/>
+            <p14:sldId id="291"/>
           </p14:sldIdLst>
         </p14:section>
       </p14:sectionLst>
@@ -251,7 +271,7 @@
           <a:p>
             <a:fld id="{3F9DA8C7-716D-E74D-B39B-E93B837A1CA6}" type="datetimeFigureOut">
               <a:rPr lang="en-US" smtClean="0"/>
-              <a:t>10/22/13</a:t>
+              <a:t>4/8/15</a:t>
             </a:fld>
             <a:endParaRPr lang="en-US"/>
           </a:p>
@@ -651,33 +671,30 @@
           <a:bodyPr/>
           <a:lstStyle/>
           <a:p>
+            <a:r>
+              <a:rPr lang="en-US" dirty="0" smtClean="0"/>
+              <a:t>Young man. Sit down.</a:t>
+            </a:r>
+          </a:p>
+          <a:p>
             <a:endParaRPr lang="en-US" dirty="0" smtClean="0"/>
           </a:p>
           <a:p>
-            <a:endParaRPr lang="en-US" dirty="0" smtClean="0"/>
-          </a:p>
-          <a:p>
-            <a:r>
-              <a:rPr lang="en-US" dirty="0" smtClean="0"/>
-              <a:t>Just</a:t>
+            <a:r>
+              <a:rPr lang="en-US" dirty="0" smtClean="0"/>
+              <a:t>This is before</a:t>
             </a:r>
             <a:r>
               <a:rPr lang="en-US" baseline="0" dirty="0" smtClean="0"/>
-              <a:t> let it happen</a:t>
-            </a:r>
-            <a:endParaRPr lang="en-US" dirty="0" smtClean="0"/>
-          </a:p>
-          <a:p>
-            <a:endParaRPr lang="en-US" dirty="0" smtClean="0"/>
-          </a:p>
-          <a:p>
-            <a:r>
-              <a:rPr lang="en-US" dirty="0" smtClean="0"/>
-              <a:t>You have</a:t>
+              <a:t> Eichmann. Just after the I.G. </a:t>
+            </a:r>
+            <a:r>
+              <a:rPr lang="en-US" baseline="0" dirty="0" err="1" smtClean="0"/>
+              <a:t>Farben</a:t>
             </a:r>
             <a:r>
               <a:rPr lang="en-US" baseline="0" dirty="0" smtClean="0"/>
-              <a:t> the image of the divine, God will use that.</a:t>
+              <a:t>, High Command, and Judge’s trials at Nuremburg. Just after the state of Israel was founded, but before it was really a thing. The sounds of 7 million martyrs was still in his ears. And he still writes this.</a:t>
             </a:r>
             <a:endParaRPr lang="en-US" dirty="0"/>
           </a:p>
@@ -700,7 +717,7 @@
           <a:p>
             <a:fld id="{F4B9BD19-34E0-3045-A049-005FB9714FDF}" type="slidenum">
               <a:rPr lang="en-US" smtClean="0"/>
-              <a:t>17</a:t>
+              <a:t>14</a:t>
             </a:fld>
             <a:endParaRPr lang="en-US"/>
           </a:p>
@@ -709,7 +726,7 @@
     </p:spTree>
     <p:extLst>
       <p:ext uri="{BB962C8B-B14F-4D97-AF65-F5344CB8AC3E}">
-        <p14:creationId xmlns:p14="http://schemas.microsoft.com/office/powerpoint/2010/main" val="3766942655"/>
+        <p14:creationId xmlns:p14="http://schemas.microsoft.com/office/powerpoint/2010/main" val="2784153146"/>
       </p:ext>
     </p:extLst>
   </p:cSld>
@@ -765,58 +782,11 @@
           <a:p>
             <a:r>
               <a:rPr lang="en-US" dirty="0" smtClean="0"/>
-              <a:t>Emotionally, spiritually, mentally,</a:t>
+              <a:t>Julian</a:t>
             </a:r>
             <a:r>
               <a:rPr lang="en-US" baseline="0" dirty="0" smtClean="0"/>
-              <a:t> etc.</a:t>
-            </a:r>
-            <a:endParaRPr lang="en-US" dirty="0" smtClean="0"/>
-          </a:p>
-          <a:p>
-            <a:endParaRPr lang="en-US" dirty="0" smtClean="0"/>
-          </a:p>
-          <a:p>
-            <a:r>
-              <a:rPr lang="en-US" dirty="0" smtClean="0"/>
-              <a:t>The LORD has a plan, but if you're not prepared he'll have to find someone else. You have within you a unique image and fingerprint of Christ. Your own spark of divinity. Be ready to let that spark shine in whatever way, </a:t>
-            </a:r>
-          </a:p>
-          <a:p>
-            <a:r>
-              <a:rPr lang="en-US" dirty="0" smtClean="0"/>
-              <a:t>shape, or form that may be. </a:t>
-            </a:r>
-          </a:p>
-          <a:p>
-            <a:endParaRPr lang="en-US" dirty="0" smtClean="0"/>
-          </a:p>
-          <a:p>
-            <a:r>
-              <a:rPr lang="en-US" dirty="0" smtClean="0"/>
-              <a:t>People don’t read anymore,</a:t>
-            </a:r>
-            <a:r>
-              <a:rPr lang="en-US" baseline="0" dirty="0" smtClean="0"/>
-              <a:t> they just don’t. They don’t have a coherent world view, let yours stand apart.</a:t>
-            </a:r>
-          </a:p>
-          <a:p>
-            <a:endParaRPr lang="en-US" baseline="0" dirty="0" smtClean="0"/>
-          </a:p>
-          <a:p>
-            <a:r>
-              <a:rPr lang="en-US" baseline="0" dirty="0" smtClean="0"/>
-              <a:t>I like this quote, it shows the tension of knowledge, truth sets free, but arguments divide</a:t>
-            </a:r>
-          </a:p>
-          <a:p>
-            <a:endParaRPr lang="en-US" baseline="0" dirty="0" smtClean="0"/>
-          </a:p>
-          <a:p>
-            <a:r>
-              <a:rPr lang="en-US" baseline="0" dirty="0" smtClean="0"/>
-              <a:t>Music is the emotional expression of our generation</a:t>
+              <a:t> knows what’s up.</a:t>
             </a:r>
             <a:endParaRPr lang="en-US" dirty="0"/>
           </a:p>
@@ -839,7 +809,7 @@
           <a:p>
             <a:fld id="{F4B9BD19-34E0-3045-A049-005FB9714FDF}" type="slidenum">
               <a:rPr lang="en-US" smtClean="0"/>
-              <a:t>19</a:t>
+              <a:t>15</a:t>
             </a:fld>
             <a:endParaRPr lang="en-US"/>
           </a:p>
@@ -848,7 +818,7 @@
     </p:spTree>
     <p:extLst>
       <p:ext uri="{BB962C8B-B14F-4D97-AF65-F5344CB8AC3E}">
-        <p14:creationId xmlns:p14="http://schemas.microsoft.com/office/powerpoint/2010/main" val="258226327"/>
+        <p14:creationId xmlns:p14="http://schemas.microsoft.com/office/powerpoint/2010/main" val="1946130556"/>
       </p:ext>
     </p:extLst>
   </p:cSld>
@@ -904,56 +874,7 @@
           <a:p>
             <a:r>
               <a:rPr lang="en-US" dirty="0" smtClean="0"/>
-              <a:t>It’s pseudo-real</a:t>
-            </a:r>
-            <a:r>
-              <a:rPr lang="en-US" baseline="0" dirty="0" smtClean="0"/>
-              <a:t>, but it’s real enough. Anyone who tells you otherwise is doing you a disservice, and lying about how they feel.</a:t>
-            </a:r>
-          </a:p>
-          <a:p>
-            <a:endParaRPr lang="en-US" baseline="0" dirty="0" smtClean="0"/>
-          </a:p>
-          <a:p>
-            <a:r>
-              <a:rPr lang="en-US" baseline="0" dirty="0" smtClean="0"/>
-              <a:t>This is your world, better it.</a:t>
-            </a:r>
-          </a:p>
-          <a:p>
-            <a:endParaRPr lang="en-US" baseline="0" dirty="0" smtClean="0"/>
-          </a:p>
-          <a:p>
-            <a:r>
-              <a:rPr lang="en-US" baseline="0" dirty="0" smtClean="0"/>
-              <a:t>(Go forward, then back)</a:t>
-            </a:r>
-          </a:p>
-          <a:p>
-            <a:r>
-              <a:rPr lang="en-US" baseline="0" dirty="0" smtClean="0"/>
-              <a:t>Do what your people do, we may not be of the world, but we are in it. Do life with people.</a:t>
-            </a:r>
-          </a:p>
-          <a:p>
-            <a:endParaRPr lang="en-US" baseline="0" dirty="0" smtClean="0"/>
-          </a:p>
-          <a:p>
-            <a:r>
-              <a:rPr lang="en-US" baseline="0" dirty="0" smtClean="0"/>
-              <a:t>We are </a:t>
-            </a:r>
-            <a:r>
-              <a:rPr lang="en-US" baseline="0" dirty="0" err="1" smtClean="0"/>
-              <a:t>AngliCANS</a:t>
-            </a:r>
-            <a:r>
-              <a:rPr lang="en-US" baseline="0" dirty="0" smtClean="0"/>
-              <a:t>, not </a:t>
-            </a:r>
-            <a:r>
-              <a:rPr lang="en-US" baseline="0" dirty="0" err="1" smtClean="0"/>
-              <a:t>AnglicaCANTS</a:t>
+              <a:t>This. All of this.</a:t>
             </a:r>
             <a:endParaRPr lang="en-US" dirty="0"/>
           </a:p>
@@ -976,7 +897,7 @@
           <a:p>
             <a:fld id="{F4B9BD19-34E0-3045-A049-005FB9714FDF}" type="slidenum">
               <a:rPr lang="en-US" smtClean="0"/>
-              <a:t>20</a:t>
+              <a:t>16</a:t>
             </a:fld>
             <a:endParaRPr lang="en-US"/>
           </a:p>
@@ -985,7 +906,7 @@
     </p:spTree>
     <p:extLst>
       <p:ext uri="{BB962C8B-B14F-4D97-AF65-F5344CB8AC3E}">
-        <p14:creationId xmlns:p14="http://schemas.microsoft.com/office/powerpoint/2010/main" val="1975669396"/>
+        <p14:creationId xmlns:p14="http://schemas.microsoft.com/office/powerpoint/2010/main" val="2784153146"/>
       </p:ext>
     </p:extLst>
   </p:cSld>
@@ -1041,7 +962,11 @@
           <a:p>
             <a:r>
               <a:rPr lang="en-US" dirty="0" smtClean="0"/>
-              <a:t>This is a really powerful verse.</a:t>
+              <a:t>These</a:t>
+            </a:r>
+            <a:r>
+              <a:rPr lang="en-US" baseline="0" dirty="0" smtClean="0"/>
+              <a:t> are some phrases that have come up in the last year.</a:t>
             </a:r>
             <a:endParaRPr lang="en-US" dirty="0"/>
           </a:p>
@@ -1064,7 +989,7 @@
           <a:p>
             <a:fld id="{F4B9BD19-34E0-3045-A049-005FB9714FDF}" type="slidenum">
               <a:rPr lang="en-US" smtClean="0"/>
-              <a:t>21</a:t>
+              <a:t>17</a:t>
             </a:fld>
             <a:endParaRPr lang="en-US"/>
           </a:p>
@@ -1073,7 +998,7 @@
     </p:spTree>
     <p:extLst>
       <p:ext uri="{BB962C8B-B14F-4D97-AF65-F5344CB8AC3E}">
-        <p14:creationId xmlns:p14="http://schemas.microsoft.com/office/powerpoint/2010/main" val="1377512372"/>
+        <p14:creationId xmlns:p14="http://schemas.microsoft.com/office/powerpoint/2010/main" val="2428854343"/>
       </p:ext>
     </p:extLst>
   </p:cSld>
@@ -1129,28 +1054,7 @@
           <a:p>
             <a:r>
               <a:rPr lang="en-US" dirty="0" smtClean="0"/>
-              <a:t>As faith has such a central role in our lives no matter how great of people our secular friends are, there will always be a part of you that is inaccessible to them. It's why we're not supposed to be 'un-equally </a:t>
-            </a:r>
-            <a:r>
-              <a:rPr lang="en-US" dirty="0" err="1" smtClean="0"/>
-              <a:t>yolked</a:t>
-            </a:r>
-            <a:r>
-              <a:rPr lang="en-US" dirty="0" smtClean="0"/>
-              <a:t>'. Find a community of believers, you'll need it.</a:t>
-            </a:r>
-          </a:p>
-          <a:p>
-            <a:endParaRPr lang="en-US" dirty="0" smtClean="0"/>
-          </a:p>
-          <a:p>
-            <a:r>
-              <a:rPr lang="en-US" dirty="0" smtClean="0"/>
-              <a:t>God never says</a:t>
-            </a:r>
-            <a:r>
-              <a:rPr lang="en-US" baseline="0" dirty="0" smtClean="0"/>
-              <a:t> don’t ask, seek and ye shall find. You won’t have all the answers, you won’t have all the faith, be with people who do.</a:t>
+              <a:t>(3 minutes)</a:t>
             </a:r>
             <a:endParaRPr lang="en-US" dirty="0"/>
           </a:p>
@@ -1173,7 +1077,7 @@
           <a:p>
             <a:fld id="{F4B9BD19-34E0-3045-A049-005FB9714FDF}" type="slidenum">
               <a:rPr lang="en-US" smtClean="0"/>
-              <a:t>22</a:t>
+              <a:t>18</a:t>
             </a:fld>
             <a:endParaRPr lang="en-US"/>
           </a:p>
@@ -1182,7 +1086,7 @@
     </p:spTree>
     <p:extLst>
       <p:ext uri="{BB962C8B-B14F-4D97-AF65-F5344CB8AC3E}">
-        <p14:creationId xmlns:p14="http://schemas.microsoft.com/office/powerpoint/2010/main" val="962703673"/>
+        <p14:creationId xmlns:p14="http://schemas.microsoft.com/office/powerpoint/2010/main" val="1565423877"/>
       </p:ext>
     </p:extLst>
   </p:cSld>
@@ -1237,55 +1141,10 @@
           <a:lstStyle/>
           <a:p>
             <a:r>
-              <a:rPr lang="en-US" dirty="0" err="1" smtClean="0"/>
-              <a:t>Trutjen</a:t>
-            </a:r>
-            <a:r>
-              <a:rPr lang="en-US" dirty="0" smtClean="0"/>
-              <a:t>(?) quote</a:t>
-            </a:r>
-          </a:p>
-          <a:p>
-            <a:endParaRPr lang="en-US" dirty="0" smtClean="0"/>
-          </a:p>
-          <a:p>
-            <a:r>
-              <a:rPr lang="en-US" dirty="0" smtClean="0"/>
-              <a:t>(Forward, then back). </a:t>
-            </a:r>
-          </a:p>
-          <a:p>
-            <a:r>
-              <a:rPr lang="en-US" dirty="0" smtClean="0"/>
-              <a:t>This is tricky, how do we balance judgment</a:t>
-            </a:r>
-            <a:r>
-              <a:rPr lang="en-US" baseline="0" dirty="0" smtClean="0"/>
-              <a:t> and mercy?</a:t>
-            </a:r>
-          </a:p>
-          <a:p>
-            <a:endParaRPr lang="en-US" baseline="0" dirty="0" smtClean="0"/>
-          </a:p>
-          <a:p>
-            <a:r>
-              <a:rPr lang="en-US" dirty="0" smtClean="0"/>
-              <a:t>Very rarely do people have a problem with your logic. Unless they're wearing a fedora, then they're an internet atheist and think you might possibly be the bottom of the intellectual barrel. But then again, they're wearing a fedora. So….</a:t>
-            </a:r>
-          </a:p>
-          <a:p>
-            <a:endParaRPr lang="en-US" dirty="0" smtClean="0"/>
-          </a:p>
-          <a:p>
-            <a:r>
-              <a:rPr lang="en-US" dirty="0" smtClean="0"/>
-              <a:t>You’re representing</a:t>
-            </a:r>
-            <a:r>
-              <a:rPr lang="en-US" baseline="0" dirty="0" smtClean="0"/>
-              <a:t> the person and temperament of Jesus Christ, carry that burden with honor and humility. </a:t>
-            </a:r>
-            <a:endParaRPr lang="en-US" dirty="0" smtClean="0"/>
+              <a:rPr lang="en-US" dirty="0" smtClean="0"/>
+              <a:t>(3 minutes)</a:t>
+            </a:r>
+            <a:endParaRPr lang="en-US" dirty="0"/>
           </a:p>
         </p:txBody>
       </p:sp>
@@ -1306,7 +1165,7 @@
           <a:p>
             <a:fld id="{F4B9BD19-34E0-3045-A049-005FB9714FDF}" type="slidenum">
               <a:rPr lang="en-US" smtClean="0"/>
-              <a:t>23</a:t>
+              <a:t>19</a:t>
             </a:fld>
             <a:endParaRPr lang="en-US"/>
           </a:p>
@@ -1315,7 +1174,7 @@
     </p:spTree>
     <p:extLst>
       <p:ext uri="{BB962C8B-B14F-4D97-AF65-F5344CB8AC3E}">
-        <p14:creationId xmlns:p14="http://schemas.microsoft.com/office/powerpoint/2010/main" val="1115069727"/>
+        <p14:creationId xmlns:p14="http://schemas.microsoft.com/office/powerpoint/2010/main" val="3619065754"/>
       </p:ext>
     </p:extLst>
   </p:cSld>
@@ -1371,7 +1230,38 @@
           <a:p>
             <a:r>
               <a:rPr lang="en-US" dirty="0" smtClean="0"/>
-              <a:t>The classic verse</a:t>
+              <a:t>(3 minutes)</a:t>
+            </a:r>
+          </a:p>
+          <a:p>
+            <a:endParaRPr lang="en-US" dirty="0" smtClean="0"/>
+          </a:p>
+          <a:p>
+            <a:r>
+              <a:rPr lang="en-US" dirty="0" smtClean="0"/>
+              <a:t>Interesting.</a:t>
+            </a:r>
+          </a:p>
+          <a:p>
+            <a:endParaRPr lang="en-US" dirty="0" smtClean="0"/>
+          </a:p>
+          <a:p>
+            <a:r>
+              <a:rPr lang="en-US" dirty="0" smtClean="0"/>
+              <a:t>So</a:t>
+            </a:r>
+            <a:r>
+              <a:rPr lang="en-US" baseline="0" dirty="0" smtClean="0"/>
+              <a:t> the question is, how do we actually do apologetics in the real world? How to we witness, minister and apologize to the people around us.</a:t>
+            </a:r>
+          </a:p>
+          <a:p>
+            <a:endParaRPr lang="en-US" baseline="0" dirty="0" smtClean="0"/>
+          </a:p>
+          <a:p>
+            <a:r>
+              <a:rPr lang="en-US" baseline="0" dirty="0" smtClean="0"/>
+              <a:t>How do we do so in a way that’s relevant to the world we live in? How do we change cultures?</a:t>
             </a:r>
             <a:endParaRPr lang="en-US" dirty="0"/>
           </a:p>
@@ -1394,7 +1284,7 @@
           <a:p>
             <a:fld id="{F4B9BD19-34E0-3045-A049-005FB9714FDF}" type="slidenum">
               <a:rPr lang="en-US" smtClean="0"/>
-              <a:t>24</a:t>
+              <a:t>20</a:t>
             </a:fld>
             <a:endParaRPr lang="en-US"/>
           </a:p>
@@ -1403,7 +1293,376 @@
     </p:spTree>
     <p:extLst>
       <p:ext uri="{BB962C8B-B14F-4D97-AF65-F5344CB8AC3E}">
-        <p14:creationId xmlns:p14="http://schemas.microsoft.com/office/powerpoint/2010/main" val="3551104534"/>
+        <p14:creationId xmlns:p14="http://schemas.microsoft.com/office/powerpoint/2010/main" val="1948308310"/>
+      </p:ext>
+    </p:extLst>
+  </p:cSld>
+  <p:clrMapOvr>
+    <a:masterClrMapping/>
+  </p:clrMapOvr>
+</p:notes>
+</file>
+
+<file path=ppt/notesSlides/notesSlide17.xml><?xml version="1.0" encoding="utf-8"?>
+<p:notes xmlns:a="http://schemas.openxmlformats.org/drawingml/2006/main" xmlns:r="http://schemas.openxmlformats.org/officeDocument/2006/relationships" xmlns:p="http://schemas.openxmlformats.org/presentationml/2006/main">
+  <p:cSld>
+    <p:spTree>
+      <p:nvGrpSpPr>
+        <p:cNvPr id="1" name=""/>
+        <p:cNvGrpSpPr/>
+        <p:nvPr/>
+      </p:nvGrpSpPr>
+      <p:grpSpPr>
+        <a:xfrm>
+          <a:off x="0" y="0"/>
+          <a:ext cx="0" cy="0"/>
+          <a:chOff x="0" y="0"/>
+          <a:chExt cx="0" cy="0"/>
+        </a:xfrm>
+      </p:grpSpPr>
+      <p:sp>
+        <p:nvSpPr>
+          <p:cNvPr id="2" name="Slide Image Placeholder 1"/>
+          <p:cNvSpPr>
+            <a:spLocks noGrp="1" noRot="1" noChangeAspect="1"/>
+          </p:cNvSpPr>
+          <p:nvPr>
+            <p:ph type="sldImg"/>
+          </p:nvPr>
+        </p:nvSpPr>
+        <p:spPr/>
+      </p:sp>
+      <p:sp>
+        <p:nvSpPr>
+          <p:cNvPr id="3" name="Notes Placeholder 2"/>
+          <p:cNvSpPr>
+            <a:spLocks noGrp="1"/>
+          </p:cNvSpPr>
+          <p:nvPr>
+            <p:ph type="body" idx="1"/>
+          </p:nvPr>
+        </p:nvSpPr>
+        <p:spPr/>
+        <p:txBody>
+          <a:bodyPr/>
+          <a:lstStyle/>
+          <a:p>
+            <a:r>
+              <a:rPr lang="en-US" dirty="0" smtClean="0"/>
+              <a:t>Nothing fancy,</a:t>
+            </a:r>
+            <a:r>
+              <a:rPr lang="en-US" baseline="0" dirty="0" smtClean="0"/>
+              <a:t> just some things I’ve learned over the past few years, both from experience, and through divine inspiration.</a:t>
+            </a:r>
+          </a:p>
+          <a:p>
+            <a:endParaRPr lang="en-US" baseline="0" dirty="0" smtClean="0"/>
+          </a:p>
+          <a:p>
+            <a:r>
+              <a:rPr lang="en-US" baseline="0" dirty="0" smtClean="0"/>
+              <a:t>I have my own life, my own world, my own call. You have you. You do you, and I’ll do me.</a:t>
+            </a:r>
+            <a:endParaRPr lang="en-US" dirty="0"/>
+          </a:p>
+        </p:txBody>
+      </p:sp>
+      <p:sp>
+        <p:nvSpPr>
+          <p:cNvPr id="4" name="Slide Number Placeholder 3"/>
+          <p:cNvSpPr>
+            <a:spLocks noGrp="1"/>
+          </p:cNvSpPr>
+          <p:nvPr>
+            <p:ph type="sldNum" sz="quarter" idx="10"/>
+          </p:nvPr>
+        </p:nvSpPr>
+        <p:spPr/>
+        <p:txBody>
+          <a:bodyPr/>
+          <a:lstStyle/>
+          <a:p>
+            <a:fld id="{F4B9BD19-34E0-3045-A049-005FB9714FDF}" type="slidenum">
+              <a:rPr lang="en-US" smtClean="0"/>
+              <a:t>21</a:t>
+            </a:fld>
+            <a:endParaRPr lang="en-US"/>
+          </a:p>
+        </p:txBody>
+      </p:sp>
+    </p:spTree>
+    <p:extLst>
+      <p:ext uri="{BB962C8B-B14F-4D97-AF65-F5344CB8AC3E}">
+        <p14:creationId xmlns:p14="http://schemas.microsoft.com/office/powerpoint/2010/main" val="615740299"/>
+      </p:ext>
+    </p:extLst>
+  </p:cSld>
+  <p:clrMapOvr>
+    <a:masterClrMapping/>
+  </p:clrMapOvr>
+</p:notes>
+</file>
+
+<file path=ppt/notesSlides/notesSlide18.xml><?xml version="1.0" encoding="utf-8"?>
+<p:notes xmlns:a="http://schemas.openxmlformats.org/drawingml/2006/main" xmlns:r="http://schemas.openxmlformats.org/officeDocument/2006/relationships" xmlns:p="http://schemas.openxmlformats.org/presentationml/2006/main">
+  <p:cSld>
+    <p:spTree>
+      <p:nvGrpSpPr>
+        <p:cNvPr id="1" name=""/>
+        <p:cNvGrpSpPr/>
+        <p:nvPr/>
+      </p:nvGrpSpPr>
+      <p:grpSpPr>
+        <a:xfrm>
+          <a:off x="0" y="0"/>
+          <a:ext cx="0" cy="0"/>
+          <a:chOff x="0" y="0"/>
+          <a:chExt cx="0" cy="0"/>
+        </a:xfrm>
+      </p:grpSpPr>
+      <p:sp>
+        <p:nvSpPr>
+          <p:cNvPr id="2" name="Slide Image Placeholder 1"/>
+          <p:cNvSpPr>
+            <a:spLocks noGrp="1" noRot="1" noChangeAspect="1"/>
+          </p:cNvSpPr>
+          <p:nvPr>
+            <p:ph type="sldImg"/>
+          </p:nvPr>
+        </p:nvSpPr>
+        <p:spPr/>
+      </p:sp>
+      <p:sp>
+        <p:nvSpPr>
+          <p:cNvPr id="3" name="Notes Placeholder 2"/>
+          <p:cNvSpPr>
+            <a:spLocks noGrp="1"/>
+          </p:cNvSpPr>
+          <p:nvPr>
+            <p:ph type="body" idx="1"/>
+          </p:nvPr>
+        </p:nvSpPr>
+        <p:spPr/>
+        <p:txBody>
+          <a:bodyPr/>
+          <a:lstStyle/>
+          <a:p>
+            <a:r>
+              <a:rPr lang="en-US" dirty="0" smtClean="0"/>
+              <a:t>Their words belie a deeper reality</a:t>
+            </a:r>
+          </a:p>
+          <a:p>
+            <a:endParaRPr lang="en-US" dirty="0" smtClean="0"/>
+          </a:p>
+          <a:p>
+            <a:r>
+              <a:rPr lang="en-US" dirty="0" smtClean="0"/>
+              <a:t>This</a:t>
+            </a:r>
+            <a:r>
+              <a:rPr lang="en-US" baseline="0" dirty="0" smtClean="0"/>
+              <a:t> freaks people out, because they can’t explain how they feel, or what they mean.</a:t>
+            </a:r>
+          </a:p>
+          <a:p>
+            <a:endParaRPr lang="en-US" baseline="0" dirty="0" smtClean="0"/>
+          </a:p>
+          <a:p>
+            <a:r>
+              <a:rPr lang="en-US" dirty="0" smtClean="0"/>
+              <a:t>(Anyone</a:t>
+            </a:r>
+            <a:r>
+              <a:rPr lang="en-US" baseline="0" dirty="0" smtClean="0"/>
+              <a:t> read Flatland?) (Summary) It’s an analog to our world, people have no idea how to handle the divine.</a:t>
+            </a:r>
+          </a:p>
+          <a:p>
+            <a:endParaRPr lang="en-US" baseline="0" dirty="0" smtClean="0"/>
+          </a:p>
+          <a:p>
+            <a:r>
+              <a:rPr lang="en-US" baseline="0" dirty="0" smtClean="0"/>
+              <a:t>This goes to the nature of language, it’s a mirror and interpreter of the world around us, thus it’s naturally deficient in the supernatural realm</a:t>
+            </a:r>
+            <a:r>
+              <a:rPr lang="en-US" baseline="0" dirty="0" smtClean="0"/>
+              <a:t>. [Heschel, Steiner]</a:t>
+            </a:r>
+            <a:endParaRPr lang="en-US" baseline="0" dirty="0" smtClean="0"/>
+          </a:p>
+          <a:p>
+            <a:endParaRPr lang="en-US" baseline="0" dirty="0" smtClean="0"/>
+          </a:p>
+          <a:p>
+            <a:r>
+              <a:rPr lang="en-US" baseline="0" dirty="0" smtClean="0"/>
+              <a:t>Language is abstract creation, Adam made it, we get to build it. It’s beautiful, but it’s dangerous. This is why the Jewish people don</a:t>
+            </a:r>
+            <a:r>
+              <a:rPr lang="fr-FR" baseline="0" dirty="0" smtClean="0"/>
+              <a:t>’</a:t>
+            </a:r>
+            <a:r>
+              <a:rPr lang="en-US" baseline="0" dirty="0" smtClean="0"/>
+              <a:t>t speak the name of God</a:t>
+            </a:r>
+            <a:r>
+              <a:rPr lang="en-US" baseline="0" dirty="0" smtClean="0"/>
+              <a:t>. [Cowan]</a:t>
+            </a:r>
+            <a:endParaRPr lang="en-US" dirty="0"/>
+          </a:p>
+        </p:txBody>
+      </p:sp>
+      <p:sp>
+        <p:nvSpPr>
+          <p:cNvPr id="4" name="Slide Number Placeholder 3"/>
+          <p:cNvSpPr>
+            <a:spLocks noGrp="1"/>
+          </p:cNvSpPr>
+          <p:nvPr>
+            <p:ph type="sldNum" sz="quarter" idx="10"/>
+          </p:nvPr>
+        </p:nvSpPr>
+        <p:spPr/>
+        <p:txBody>
+          <a:bodyPr/>
+          <a:lstStyle/>
+          <a:p>
+            <a:fld id="{F4B9BD19-34E0-3045-A049-005FB9714FDF}" type="slidenum">
+              <a:rPr lang="en-US" smtClean="0"/>
+              <a:t>22</a:t>
+            </a:fld>
+            <a:endParaRPr lang="en-US"/>
+          </a:p>
+        </p:txBody>
+      </p:sp>
+    </p:spTree>
+    <p:extLst>
+      <p:ext uri="{BB962C8B-B14F-4D97-AF65-F5344CB8AC3E}">
+        <p14:creationId xmlns:p14="http://schemas.microsoft.com/office/powerpoint/2010/main" val="3407028232"/>
+      </p:ext>
+    </p:extLst>
+  </p:cSld>
+  <p:clrMapOvr>
+    <a:masterClrMapping/>
+  </p:clrMapOvr>
+</p:notes>
+</file>
+
+<file path=ppt/notesSlides/notesSlide19.xml><?xml version="1.0" encoding="utf-8"?>
+<p:notes xmlns:a="http://schemas.openxmlformats.org/drawingml/2006/main" xmlns:r="http://schemas.openxmlformats.org/officeDocument/2006/relationships" xmlns:p="http://schemas.openxmlformats.org/presentationml/2006/main">
+  <p:cSld>
+    <p:spTree>
+      <p:nvGrpSpPr>
+        <p:cNvPr id="1" name=""/>
+        <p:cNvGrpSpPr/>
+        <p:nvPr/>
+      </p:nvGrpSpPr>
+      <p:grpSpPr>
+        <a:xfrm>
+          <a:off x="0" y="0"/>
+          <a:ext cx="0" cy="0"/>
+          <a:chOff x="0" y="0"/>
+          <a:chExt cx="0" cy="0"/>
+        </a:xfrm>
+      </p:grpSpPr>
+      <p:sp>
+        <p:nvSpPr>
+          <p:cNvPr id="2" name="Slide Image Placeholder 1"/>
+          <p:cNvSpPr>
+            <a:spLocks noGrp="1" noRot="1" noChangeAspect="1"/>
+          </p:cNvSpPr>
+          <p:nvPr>
+            <p:ph type="sldImg"/>
+          </p:nvPr>
+        </p:nvSpPr>
+        <p:spPr/>
+      </p:sp>
+      <p:sp>
+        <p:nvSpPr>
+          <p:cNvPr id="3" name="Notes Placeholder 2"/>
+          <p:cNvSpPr>
+            <a:spLocks noGrp="1"/>
+          </p:cNvSpPr>
+          <p:nvPr>
+            <p:ph type="body" idx="1"/>
+          </p:nvPr>
+        </p:nvSpPr>
+        <p:spPr/>
+        <p:txBody>
+          <a:bodyPr/>
+          <a:lstStyle/>
+          <a:p>
+            <a:r>
+              <a:rPr lang="en-US" dirty="0" smtClean="0"/>
+              <a:t>In the Midwest, the structures and institutions of a culture of faith are still around. They may be decaying, but they're still there. If you leave here, you may not find that to be the case. That makes faith really hard, not because we're weak or unfaithful, but because our beliefs and ideas exist within a framework of community, and if that community suddenly vanishes, it's hard to know what to do next</a:t>
+            </a:r>
+            <a:r>
+              <a:rPr lang="en-US" dirty="0" smtClean="0"/>
+              <a:t>.</a:t>
+            </a:r>
+            <a:r>
+              <a:rPr lang="en-US" baseline="0" dirty="0" smtClean="0"/>
+              <a:t> Some places of this world are post-Christian (like Europe), other places are Post-Post-Christian (like the Northwest). </a:t>
+            </a:r>
+            <a:endParaRPr lang="en-US" dirty="0" smtClean="0"/>
+          </a:p>
+          <a:p>
+            <a:endParaRPr lang="en-US" dirty="0" smtClean="0"/>
+          </a:p>
+          <a:p>
+            <a:r>
+              <a:rPr lang="en-US" dirty="0" smtClean="0"/>
+              <a:t>It’s easy</a:t>
+            </a:r>
+            <a:r>
+              <a:rPr lang="en-US" baseline="0" dirty="0" smtClean="0"/>
+              <a:t> to be a Christian here (sort of), it’s harder to be a Christian out there. It grinds on you (Sometimes a Great Notion)</a:t>
+            </a:r>
+          </a:p>
+          <a:p>
+            <a:endParaRPr lang="en-US" baseline="0" dirty="0" smtClean="0"/>
+          </a:p>
+          <a:p>
+            <a:r>
+              <a:rPr lang="en-US" baseline="0" dirty="0" smtClean="0"/>
+              <a:t>Just like Chesterton said, that means we won’t every fully feel connected here, but that’s ok. ‘Further up and further in’.</a:t>
+            </a:r>
+            <a:endParaRPr lang="en-US" dirty="0"/>
+          </a:p>
+        </p:txBody>
+      </p:sp>
+      <p:sp>
+        <p:nvSpPr>
+          <p:cNvPr id="4" name="Slide Number Placeholder 3"/>
+          <p:cNvSpPr>
+            <a:spLocks noGrp="1"/>
+          </p:cNvSpPr>
+          <p:nvPr>
+            <p:ph type="sldNum" sz="quarter" idx="10"/>
+          </p:nvPr>
+        </p:nvSpPr>
+        <p:spPr/>
+        <p:txBody>
+          <a:bodyPr/>
+          <a:lstStyle/>
+          <a:p>
+            <a:fld id="{F4B9BD19-34E0-3045-A049-005FB9714FDF}" type="slidenum">
+              <a:rPr lang="en-US" smtClean="0"/>
+              <a:t>23</a:t>
+            </a:fld>
+            <a:endParaRPr lang="en-US"/>
+          </a:p>
+        </p:txBody>
+      </p:sp>
+    </p:spTree>
+    <p:extLst>
+      <p:ext uri="{BB962C8B-B14F-4D97-AF65-F5344CB8AC3E}">
+        <p14:creationId xmlns:p14="http://schemas.microsoft.com/office/powerpoint/2010/main" val="2973207228"/>
       </p:ext>
     </p:extLst>
   </p:cSld>
@@ -1505,6 +1764,980 @@
 </p:notes>
 </file>
 
+<file path=ppt/notesSlides/notesSlide20.xml><?xml version="1.0" encoding="utf-8"?>
+<p:notes xmlns:a="http://schemas.openxmlformats.org/drawingml/2006/main" xmlns:r="http://schemas.openxmlformats.org/officeDocument/2006/relationships" xmlns:p="http://schemas.openxmlformats.org/presentationml/2006/main">
+  <p:cSld>
+    <p:spTree>
+      <p:nvGrpSpPr>
+        <p:cNvPr id="1" name=""/>
+        <p:cNvGrpSpPr/>
+        <p:nvPr/>
+      </p:nvGrpSpPr>
+      <p:grpSpPr>
+        <a:xfrm>
+          <a:off x="0" y="0"/>
+          <a:ext cx="0" cy="0"/>
+          <a:chOff x="0" y="0"/>
+          <a:chExt cx="0" cy="0"/>
+        </a:xfrm>
+      </p:grpSpPr>
+      <p:sp>
+        <p:nvSpPr>
+          <p:cNvPr id="2" name="Slide Image Placeholder 1"/>
+          <p:cNvSpPr>
+            <a:spLocks noGrp="1" noRot="1" noChangeAspect="1"/>
+          </p:cNvSpPr>
+          <p:nvPr>
+            <p:ph type="sldImg"/>
+          </p:nvPr>
+        </p:nvSpPr>
+        <p:spPr/>
+      </p:sp>
+      <p:sp>
+        <p:nvSpPr>
+          <p:cNvPr id="3" name="Notes Placeholder 2"/>
+          <p:cNvSpPr>
+            <a:spLocks noGrp="1"/>
+          </p:cNvSpPr>
+          <p:nvPr>
+            <p:ph type="body" idx="1"/>
+          </p:nvPr>
+        </p:nvSpPr>
+        <p:spPr/>
+        <p:txBody>
+          <a:bodyPr/>
+          <a:lstStyle/>
+          <a:p>
+            <a:r>
+              <a:rPr lang="en-US" dirty="0" err="1" smtClean="0"/>
+              <a:t>Shh</a:t>
+            </a:r>
+            <a:r>
+              <a:rPr lang="en-US" dirty="0" smtClean="0"/>
+              <a:t>,</a:t>
+            </a:r>
+            <a:r>
+              <a:rPr lang="en-US" baseline="0" dirty="0" smtClean="0"/>
+              <a:t> </a:t>
+            </a:r>
+            <a:r>
+              <a:rPr lang="en-US" baseline="0" dirty="0" err="1" smtClean="0"/>
+              <a:t>shh</a:t>
+            </a:r>
+            <a:r>
+              <a:rPr lang="en-US" baseline="0" dirty="0" smtClean="0"/>
+              <a:t>, </a:t>
+            </a:r>
+            <a:r>
+              <a:rPr lang="en-US" baseline="0" dirty="0" err="1" smtClean="0"/>
+              <a:t>ssh</a:t>
+            </a:r>
+            <a:r>
+              <a:rPr lang="en-US" baseline="0" dirty="0" smtClean="0"/>
+              <a:t>. Just let </a:t>
+            </a:r>
+            <a:r>
+              <a:rPr lang="en-US" baseline="0" smtClean="0"/>
+              <a:t>it happen.</a:t>
+            </a:r>
+            <a:endParaRPr lang="en-US" dirty="0" smtClean="0"/>
+          </a:p>
+          <a:p>
+            <a:endParaRPr lang="en-US" dirty="0" smtClean="0"/>
+          </a:p>
+          <a:p>
+            <a:r>
+              <a:rPr lang="en-US" dirty="0" smtClean="0"/>
+              <a:t>You have</a:t>
+            </a:r>
+            <a:r>
+              <a:rPr lang="en-US" baseline="0" dirty="0" smtClean="0"/>
+              <a:t> the image of the divine, God will use that.</a:t>
+            </a:r>
+            <a:endParaRPr lang="en-US" dirty="0"/>
+          </a:p>
+        </p:txBody>
+      </p:sp>
+      <p:sp>
+        <p:nvSpPr>
+          <p:cNvPr id="4" name="Slide Number Placeholder 3"/>
+          <p:cNvSpPr>
+            <a:spLocks noGrp="1"/>
+          </p:cNvSpPr>
+          <p:nvPr>
+            <p:ph type="sldNum" sz="quarter" idx="10"/>
+          </p:nvPr>
+        </p:nvSpPr>
+        <p:spPr/>
+        <p:txBody>
+          <a:bodyPr/>
+          <a:lstStyle/>
+          <a:p>
+            <a:fld id="{F4B9BD19-34E0-3045-A049-005FB9714FDF}" type="slidenum">
+              <a:rPr lang="en-US" smtClean="0"/>
+              <a:t>24</a:t>
+            </a:fld>
+            <a:endParaRPr lang="en-US"/>
+          </a:p>
+        </p:txBody>
+      </p:sp>
+    </p:spTree>
+    <p:extLst>
+      <p:ext uri="{BB962C8B-B14F-4D97-AF65-F5344CB8AC3E}">
+        <p14:creationId xmlns:p14="http://schemas.microsoft.com/office/powerpoint/2010/main" val="3766942655"/>
+      </p:ext>
+    </p:extLst>
+  </p:cSld>
+  <p:clrMapOvr>
+    <a:masterClrMapping/>
+  </p:clrMapOvr>
+</p:notes>
+</file>
+
+<file path=ppt/notesSlides/notesSlide21.xml><?xml version="1.0" encoding="utf-8"?>
+<p:notes xmlns:a="http://schemas.openxmlformats.org/drawingml/2006/main" xmlns:r="http://schemas.openxmlformats.org/officeDocument/2006/relationships" xmlns:p="http://schemas.openxmlformats.org/presentationml/2006/main">
+  <p:cSld>
+    <p:spTree>
+      <p:nvGrpSpPr>
+        <p:cNvPr id="1" name=""/>
+        <p:cNvGrpSpPr/>
+        <p:nvPr/>
+      </p:nvGrpSpPr>
+      <p:grpSpPr>
+        <a:xfrm>
+          <a:off x="0" y="0"/>
+          <a:ext cx="0" cy="0"/>
+          <a:chOff x="0" y="0"/>
+          <a:chExt cx="0" cy="0"/>
+        </a:xfrm>
+      </p:grpSpPr>
+      <p:sp>
+        <p:nvSpPr>
+          <p:cNvPr id="2" name="Slide Image Placeholder 1"/>
+          <p:cNvSpPr>
+            <a:spLocks noGrp="1" noRot="1" noChangeAspect="1"/>
+          </p:cNvSpPr>
+          <p:nvPr>
+            <p:ph type="sldImg"/>
+          </p:nvPr>
+        </p:nvSpPr>
+        <p:spPr/>
+      </p:sp>
+      <p:sp>
+        <p:nvSpPr>
+          <p:cNvPr id="3" name="Notes Placeholder 2"/>
+          <p:cNvSpPr>
+            <a:spLocks noGrp="1"/>
+          </p:cNvSpPr>
+          <p:nvPr>
+            <p:ph type="body" idx="1"/>
+          </p:nvPr>
+        </p:nvSpPr>
+        <p:spPr/>
+        <p:txBody>
+          <a:bodyPr/>
+          <a:lstStyle/>
+          <a:p>
+            <a:r>
+              <a:rPr lang="en-US" dirty="0" smtClean="0"/>
+              <a:t>Emotionally, spiritually, mentally,</a:t>
+            </a:r>
+            <a:r>
+              <a:rPr lang="en-US" baseline="0" dirty="0" smtClean="0"/>
+              <a:t> etc.</a:t>
+            </a:r>
+            <a:endParaRPr lang="en-US" dirty="0" smtClean="0"/>
+          </a:p>
+          <a:p>
+            <a:endParaRPr lang="en-US" dirty="0" smtClean="0"/>
+          </a:p>
+          <a:p>
+            <a:r>
+              <a:rPr lang="en-US" dirty="0" smtClean="0"/>
+              <a:t>The LORD has a plan, but if you're not prepared he'll have to find someone else. You have within you a unique image and fingerprint of Christ. Your own spark of divinity. Be ready to let that spark shine in whatever way, </a:t>
+            </a:r>
+            <a:r>
+              <a:rPr lang="en-US" dirty="0" smtClean="0"/>
+              <a:t>shape</a:t>
+            </a:r>
+            <a:r>
+              <a:rPr lang="en-US" dirty="0" smtClean="0"/>
+              <a:t>, or form that may be. </a:t>
+            </a:r>
+          </a:p>
+          <a:p>
+            <a:endParaRPr lang="en-US" dirty="0" smtClean="0"/>
+          </a:p>
+          <a:p>
+            <a:r>
+              <a:rPr lang="en-US" dirty="0" smtClean="0"/>
+              <a:t>People don’t read anymore,</a:t>
+            </a:r>
+            <a:r>
+              <a:rPr lang="en-US" baseline="0" dirty="0" smtClean="0"/>
+              <a:t> they just don’t. They don’t have a coherent world view, let yours stand apart.</a:t>
+            </a:r>
+          </a:p>
+          <a:p>
+            <a:endParaRPr lang="en-US" baseline="0" dirty="0" smtClean="0"/>
+          </a:p>
+          <a:p>
+            <a:r>
+              <a:rPr lang="en-US" baseline="0" dirty="0" smtClean="0"/>
+              <a:t>I like this quote, it shows the tension of knowledge, truth sets free, but arguments divide</a:t>
+            </a:r>
+          </a:p>
+          <a:p>
+            <a:endParaRPr lang="en-US" baseline="0" dirty="0" smtClean="0"/>
+          </a:p>
+          <a:p>
+            <a:r>
+              <a:rPr lang="en-US" baseline="0" dirty="0" smtClean="0"/>
+              <a:t>Music is the emotional expression of our generation</a:t>
+            </a:r>
+            <a:endParaRPr lang="en-US" dirty="0"/>
+          </a:p>
+        </p:txBody>
+      </p:sp>
+      <p:sp>
+        <p:nvSpPr>
+          <p:cNvPr id="4" name="Slide Number Placeholder 3"/>
+          <p:cNvSpPr>
+            <a:spLocks noGrp="1"/>
+          </p:cNvSpPr>
+          <p:nvPr>
+            <p:ph type="sldNum" sz="quarter" idx="10"/>
+          </p:nvPr>
+        </p:nvSpPr>
+        <p:spPr/>
+        <p:txBody>
+          <a:bodyPr/>
+          <a:lstStyle/>
+          <a:p>
+            <a:fld id="{F4B9BD19-34E0-3045-A049-005FB9714FDF}" type="slidenum">
+              <a:rPr lang="en-US" smtClean="0"/>
+              <a:t>26</a:t>
+            </a:fld>
+            <a:endParaRPr lang="en-US"/>
+          </a:p>
+        </p:txBody>
+      </p:sp>
+    </p:spTree>
+    <p:extLst>
+      <p:ext uri="{BB962C8B-B14F-4D97-AF65-F5344CB8AC3E}">
+        <p14:creationId xmlns:p14="http://schemas.microsoft.com/office/powerpoint/2010/main" val="258226327"/>
+      </p:ext>
+    </p:extLst>
+  </p:cSld>
+  <p:clrMapOvr>
+    <a:masterClrMapping/>
+  </p:clrMapOvr>
+</p:notes>
+</file>
+
+<file path=ppt/notesSlides/notesSlide22.xml><?xml version="1.0" encoding="utf-8"?>
+<p:notes xmlns:a="http://schemas.openxmlformats.org/drawingml/2006/main" xmlns:r="http://schemas.openxmlformats.org/officeDocument/2006/relationships" xmlns:p="http://schemas.openxmlformats.org/presentationml/2006/main">
+  <p:cSld>
+    <p:spTree>
+      <p:nvGrpSpPr>
+        <p:cNvPr id="1" name=""/>
+        <p:cNvGrpSpPr/>
+        <p:nvPr/>
+      </p:nvGrpSpPr>
+      <p:grpSpPr>
+        <a:xfrm>
+          <a:off x="0" y="0"/>
+          <a:ext cx="0" cy="0"/>
+          <a:chOff x="0" y="0"/>
+          <a:chExt cx="0" cy="0"/>
+        </a:xfrm>
+      </p:grpSpPr>
+      <p:sp>
+        <p:nvSpPr>
+          <p:cNvPr id="2" name="Slide Image Placeholder 1"/>
+          <p:cNvSpPr>
+            <a:spLocks noGrp="1" noRot="1" noChangeAspect="1"/>
+          </p:cNvSpPr>
+          <p:nvPr>
+            <p:ph type="sldImg"/>
+          </p:nvPr>
+        </p:nvSpPr>
+        <p:spPr/>
+      </p:sp>
+      <p:sp>
+        <p:nvSpPr>
+          <p:cNvPr id="3" name="Notes Placeholder 2"/>
+          <p:cNvSpPr>
+            <a:spLocks noGrp="1"/>
+          </p:cNvSpPr>
+          <p:nvPr>
+            <p:ph type="body" idx="1"/>
+          </p:nvPr>
+        </p:nvSpPr>
+        <p:spPr/>
+        <p:txBody>
+          <a:bodyPr/>
+          <a:lstStyle/>
+          <a:p>
+            <a:r>
+              <a:rPr lang="en-US" dirty="0" smtClean="0"/>
+              <a:t>It’s pseudo-real</a:t>
+            </a:r>
+            <a:r>
+              <a:rPr lang="en-US" baseline="0" dirty="0" smtClean="0"/>
+              <a:t>, but it’s real enough. Anyone who tells you otherwise is doing you a disservice, and lying about how they feel. Also, our bodies are way too tuned to this ‘world’ for it to be just a myth.</a:t>
+            </a:r>
+          </a:p>
+          <a:p>
+            <a:endParaRPr lang="en-US" baseline="0" dirty="0" smtClean="0"/>
+          </a:p>
+          <a:p>
+            <a:r>
+              <a:rPr lang="en-US" baseline="0" dirty="0" smtClean="0"/>
+              <a:t>This is your world, better it.</a:t>
+            </a:r>
+          </a:p>
+          <a:p>
+            <a:endParaRPr lang="en-US" baseline="0" dirty="0" smtClean="0"/>
+          </a:p>
+          <a:p>
+            <a:r>
+              <a:rPr lang="en-US" baseline="0" dirty="0" smtClean="0"/>
+              <a:t>(Next slide, then come back)</a:t>
+            </a:r>
+          </a:p>
+          <a:p>
+            <a:r>
+              <a:rPr lang="en-US" baseline="0" dirty="0" smtClean="0"/>
+              <a:t>Do what your people do, we may not be of the world, but we are in it. Do life with people. Love this World.</a:t>
+            </a:r>
+          </a:p>
+          <a:p>
+            <a:endParaRPr lang="en-US" baseline="0" dirty="0" smtClean="0"/>
+          </a:p>
+          <a:p>
+            <a:r>
+              <a:rPr lang="en-US" baseline="0" dirty="0" smtClean="0"/>
+              <a:t>We are </a:t>
+            </a:r>
+            <a:r>
+              <a:rPr lang="en-US" baseline="0" dirty="0" err="1" smtClean="0"/>
+              <a:t>AngliCANS</a:t>
+            </a:r>
+            <a:r>
+              <a:rPr lang="en-US" baseline="0" dirty="0" smtClean="0"/>
+              <a:t>, not </a:t>
+            </a:r>
+            <a:r>
+              <a:rPr lang="en-US" baseline="0" dirty="0" err="1" smtClean="0"/>
+              <a:t>AnglicaCANTS</a:t>
+            </a:r>
+            <a:endParaRPr lang="en-US" baseline="0" dirty="0" smtClean="0"/>
+          </a:p>
+          <a:p>
+            <a:endParaRPr lang="en-US" baseline="0" dirty="0" smtClean="0"/>
+          </a:p>
+          <a:p>
+            <a:r>
+              <a:rPr lang="en-US" dirty="0" smtClean="0"/>
+              <a:t>Everything emanates</a:t>
+            </a:r>
+            <a:r>
+              <a:rPr lang="en-US" baseline="0" dirty="0" smtClean="0"/>
+              <a:t> from community!!!!</a:t>
+            </a:r>
+          </a:p>
+          <a:p>
+            <a:endParaRPr lang="en-US" baseline="0" dirty="0" smtClean="0"/>
+          </a:p>
+          <a:p>
+            <a:r>
+              <a:rPr lang="en-US" baseline="0" dirty="0" smtClean="0"/>
+              <a:t>The story of Genesis is a divine </a:t>
+            </a:r>
+            <a:r>
+              <a:rPr lang="en-US" baseline="0" dirty="0" err="1" smtClean="0"/>
+              <a:t>mic</a:t>
+            </a:r>
+            <a:r>
+              <a:rPr lang="en-US" baseline="0" dirty="0" smtClean="0"/>
+              <a:t> drop, a spiritual ‘come at me bro’, and its central theme (or one of) is Community. Man and Woman. God and Man. God and Community. Man and Community. That’s where it starts, and that’s where it ends. (Louise Cowen essay)</a:t>
+            </a:r>
+            <a:endParaRPr lang="en-US" dirty="0" smtClean="0"/>
+          </a:p>
+          <a:p>
+            <a:endParaRPr lang="en-US" dirty="0"/>
+          </a:p>
+        </p:txBody>
+      </p:sp>
+      <p:sp>
+        <p:nvSpPr>
+          <p:cNvPr id="4" name="Slide Number Placeholder 3"/>
+          <p:cNvSpPr>
+            <a:spLocks noGrp="1"/>
+          </p:cNvSpPr>
+          <p:nvPr>
+            <p:ph type="sldNum" sz="quarter" idx="10"/>
+          </p:nvPr>
+        </p:nvSpPr>
+        <p:spPr/>
+        <p:txBody>
+          <a:bodyPr/>
+          <a:lstStyle/>
+          <a:p>
+            <a:fld id="{F4B9BD19-34E0-3045-A049-005FB9714FDF}" type="slidenum">
+              <a:rPr lang="en-US" smtClean="0"/>
+              <a:t>27</a:t>
+            </a:fld>
+            <a:endParaRPr lang="en-US"/>
+          </a:p>
+        </p:txBody>
+      </p:sp>
+    </p:spTree>
+    <p:extLst>
+      <p:ext uri="{BB962C8B-B14F-4D97-AF65-F5344CB8AC3E}">
+        <p14:creationId xmlns:p14="http://schemas.microsoft.com/office/powerpoint/2010/main" val="1975669396"/>
+      </p:ext>
+    </p:extLst>
+  </p:cSld>
+  <p:clrMapOvr>
+    <a:masterClrMapping/>
+  </p:clrMapOvr>
+</p:notes>
+</file>
+
+<file path=ppt/notesSlides/notesSlide23.xml><?xml version="1.0" encoding="utf-8"?>
+<p:notes xmlns:a="http://schemas.openxmlformats.org/drawingml/2006/main" xmlns:r="http://schemas.openxmlformats.org/officeDocument/2006/relationships" xmlns:p="http://schemas.openxmlformats.org/presentationml/2006/main">
+  <p:cSld>
+    <p:spTree>
+      <p:nvGrpSpPr>
+        <p:cNvPr id="1" name=""/>
+        <p:cNvGrpSpPr/>
+        <p:nvPr/>
+      </p:nvGrpSpPr>
+      <p:grpSpPr>
+        <a:xfrm>
+          <a:off x="0" y="0"/>
+          <a:ext cx="0" cy="0"/>
+          <a:chOff x="0" y="0"/>
+          <a:chExt cx="0" cy="0"/>
+        </a:xfrm>
+      </p:grpSpPr>
+      <p:sp>
+        <p:nvSpPr>
+          <p:cNvPr id="2" name="Slide Image Placeholder 1"/>
+          <p:cNvSpPr>
+            <a:spLocks noGrp="1" noRot="1" noChangeAspect="1"/>
+          </p:cNvSpPr>
+          <p:nvPr>
+            <p:ph type="sldImg"/>
+          </p:nvPr>
+        </p:nvSpPr>
+        <p:spPr/>
+      </p:sp>
+      <p:sp>
+        <p:nvSpPr>
+          <p:cNvPr id="3" name="Notes Placeholder 2"/>
+          <p:cNvSpPr>
+            <a:spLocks noGrp="1"/>
+          </p:cNvSpPr>
+          <p:nvPr>
+            <p:ph type="body" idx="1"/>
+          </p:nvPr>
+        </p:nvSpPr>
+        <p:spPr/>
+        <p:txBody>
+          <a:bodyPr/>
+          <a:lstStyle/>
+          <a:p>
+            <a:r>
+              <a:rPr lang="en-US" dirty="0" smtClean="0"/>
+              <a:t>This is a really powerful verse.</a:t>
+            </a:r>
+          </a:p>
+          <a:p>
+            <a:endParaRPr lang="en-US" dirty="0" smtClean="0"/>
+          </a:p>
+          <a:p>
+            <a:r>
+              <a:rPr lang="en-US" dirty="0" smtClean="0"/>
+              <a:t>LOVE THIS WORLD!!!!</a:t>
+            </a:r>
+            <a:endParaRPr lang="en-US" dirty="0"/>
+          </a:p>
+        </p:txBody>
+      </p:sp>
+      <p:sp>
+        <p:nvSpPr>
+          <p:cNvPr id="4" name="Slide Number Placeholder 3"/>
+          <p:cNvSpPr>
+            <a:spLocks noGrp="1"/>
+          </p:cNvSpPr>
+          <p:nvPr>
+            <p:ph type="sldNum" sz="quarter" idx="10"/>
+          </p:nvPr>
+        </p:nvSpPr>
+        <p:spPr/>
+        <p:txBody>
+          <a:bodyPr/>
+          <a:lstStyle/>
+          <a:p>
+            <a:fld id="{F4B9BD19-34E0-3045-A049-005FB9714FDF}" type="slidenum">
+              <a:rPr lang="en-US" smtClean="0"/>
+              <a:t>28</a:t>
+            </a:fld>
+            <a:endParaRPr lang="en-US"/>
+          </a:p>
+        </p:txBody>
+      </p:sp>
+    </p:spTree>
+    <p:extLst>
+      <p:ext uri="{BB962C8B-B14F-4D97-AF65-F5344CB8AC3E}">
+        <p14:creationId xmlns:p14="http://schemas.microsoft.com/office/powerpoint/2010/main" val="1377512372"/>
+      </p:ext>
+    </p:extLst>
+  </p:cSld>
+  <p:clrMapOvr>
+    <a:masterClrMapping/>
+  </p:clrMapOvr>
+</p:notes>
+</file>
+
+<file path=ppt/notesSlides/notesSlide24.xml><?xml version="1.0" encoding="utf-8"?>
+<p:notes xmlns:a="http://schemas.openxmlformats.org/drawingml/2006/main" xmlns:r="http://schemas.openxmlformats.org/officeDocument/2006/relationships" xmlns:p="http://schemas.openxmlformats.org/presentationml/2006/main">
+  <p:cSld>
+    <p:spTree>
+      <p:nvGrpSpPr>
+        <p:cNvPr id="1" name=""/>
+        <p:cNvGrpSpPr/>
+        <p:nvPr/>
+      </p:nvGrpSpPr>
+      <p:grpSpPr>
+        <a:xfrm>
+          <a:off x="0" y="0"/>
+          <a:ext cx="0" cy="0"/>
+          <a:chOff x="0" y="0"/>
+          <a:chExt cx="0" cy="0"/>
+        </a:xfrm>
+      </p:grpSpPr>
+      <p:sp>
+        <p:nvSpPr>
+          <p:cNvPr id="2" name="Slide Image Placeholder 1"/>
+          <p:cNvSpPr>
+            <a:spLocks noGrp="1" noRot="1" noChangeAspect="1"/>
+          </p:cNvSpPr>
+          <p:nvPr>
+            <p:ph type="sldImg"/>
+          </p:nvPr>
+        </p:nvSpPr>
+        <p:spPr/>
+      </p:sp>
+      <p:sp>
+        <p:nvSpPr>
+          <p:cNvPr id="3" name="Notes Placeholder 2"/>
+          <p:cNvSpPr>
+            <a:spLocks noGrp="1"/>
+          </p:cNvSpPr>
+          <p:nvPr>
+            <p:ph type="body" idx="1"/>
+          </p:nvPr>
+        </p:nvSpPr>
+        <p:spPr/>
+        <p:txBody>
+          <a:bodyPr/>
+          <a:lstStyle/>
+          <a:p>
+            <a:r>
+              <a:rPr lang="en-US" dirty="0" smtClean="0"/>
+              <a:t>As faith has such a central role in our lives no matter how great of people our secular friends are, there will always be a part of you that is inaccessible to them. It's why we're not supposed to be 'un-equally </a:t>
+            </a:r>
+            <a:r>
+              <a:rPr lang="en-US" dirty="0" err="1" smtClean="0"/>
+              <a:t>yolked</a:t>
+            </a:r>
+            <a:r>
+              <a:rPr lang="en-US" dirty="0" smtClean="0"/>
+              <a:t>'. Find a community of believers, you'll need it.</a:t>
+            </a:r>
+          </a:p>
+          <a:p>
+            <a:endParaRPr lang="en-US" dirty="0" smtClean="0"/>
+          </a:p>
+          <a:p>
+            <a:r>
+              <a:rPr lang="en-US" dirty="0" smtClean="0"/>
+              <a:t>God never says</a:t>
+            </a:r>
+            <a:r>
+              <a:rPr lang="en-US" baseline="0" dirty="0" smtClean="0"/>
+              <a:t> don’t ask, seek and ye shall find. You won’t have all the answers, you won’t have all the faith, be with people who do</a:t>
+            </a:r>
+            <a:r>
+              <a:rPr lang="en-US" baseline="0" dirty="0" smtClean="0"/>
+              <a:t>.</a:t>
+            </a:r>
+          </a:p>
+          <a:p>
+            <a:endParaRPr lang="en-US" baseline="0" dirty="0" smtClean="0"/>
+          </a:p>
+          <a:p>
+            <a:r>
+              <a:rPr lang="en-US" baseline="0" dirty="0" smtClean="0"/>
+              <a:t>The Rabbi says that doubt is the auditor of the brain. You can’t doubt what you don’t already believe.</a:t>
+            </a:r>
+            <a:endParaRPr lang="en-US" dirty="0"/>
+          </a:p>
+        </p:txBody>
+      </p:sp>
+      <p:sp>
+        <p:nvSpPr>
+          <p:cNvPr id="4" name="Slide Number Placeholder 3"/>
+          <p:cNvSpPr>
+            <a:spLocks noGrp="1"/>
+          </p:cNvSpPr>
+          <p:nvPr>
+            <p:ph type="sldNum" sz="quarter" idx="10"/>
+          </p:nvPr>
+        </p:nvSpPr>
+        <p:spPr/>
+        <p:txBody>
+          <a:bodyPr/>
+          <a:lstStyle/>
+          <a:p>
+            <a:fld id="{F4B9BD19-34E0-3045-A049-005FB9714FDF}" type="slidenum">
+              <a:rPr lang="en-US" smtClean="0"/>
+              <a:t>29</a:t>
+            </a:fld>
+            <a:endParaRPr lang="en-US"/>
+          </a:p>
+        </p:txBody>
+      </p:sp>
+    </p:spTree>
+    <p:extLst>
+      <p:ext uri="{BB962C8B-B14F-4D97-AF65-F5344CB8AC3E}">
+        <p14:creationId xmlns:p14="http://schemas.microsoft.com/office/powerpoint/2010/main" val="962703673"/>
+      </p:ext>
+    </p:extLst>
+  </p:cSld>
+  <p:clrMapOvr>
+    <a:masterClrMapping/>
+  </p:clrMapOvr>
+</p:notes>
+</file>
+
+<file path=ppt/notesSlides/notesSlide25.xml><?xml version="1.0" encoding="utf-8"?>
+<p:notes xmlns:a="http://schemas.openxmlformats.org/drawingml/2006/main" xmlns:r="http://schemas.openxmlformats.org/officeDocument/2006/relationships" xmlns:p="http://schemas.openxmlformats.org/presentationml/2006/main">
+  <p:cSld>
+    <p:spTree>
+      <p:nvGrpSpPr>
+        <p:cNvPr id="1" name=""/>
+        <p:cNvGrpSpPr/>
+        <p:nvPr/>
+      </p:nvGrpSpPr>
+      <p:grpSpPr>
+        <a:xfrm>
+          <a:off x="0" y="0"/>
+          <a:ext cx="0" cy="0"/>
+          <a:chOff x="0" y="0"/>
+          <a:chExt cx="0" cy="0"/>
+        </a:xfrm>
+      </p:grpSpPr>
+      <p:sp>
+        <p:nvSpPr>
+          <p:cNvPr id="2" name="Slide Image Placeholder 1"/>
+          <p:cNvSpPr>
+            <a:spLocks noGrp="1" noRot="1" noChangeAspect="1"/>
+          </p:cNvSpPr>
+          <p:nvPr>
+            <p:ph type="sldImg"/>
+          </p:nvPr>
+        </p:nvSpPr>
+        <p:spPr/>
+      </p:sp>
+      <p:sp>
+        <p:nvSpPr>
+          <p:cNvPr id="3" name="Notes Placeholder 2"/>
+          <p:cNvSpPr>
+            <a:spLocks noGrp="1"/>
+          </p:cNvSpPr>
+          <p:nvPr>
+            <p:ph type="body" idx="1"/>
+          </p:nvPr>
+        </p:nvSpPr>
+        <p:spPr/>
+        <p:txBody>
+          <a:bodyPr/>
+          <a:lstStyle/>
+          <a:p>
+            <a:r>
+              <a:rPr lang="en-US" dirty="0" err="1" smtClean="0"/>
+              <a:t>Trutjen</a:t>
+            </a:r>
+            <a:r>
+              <a:rPr lang="en-US" dirty="0" smtClean="0"/>
+              <a:t>(?) quote</a:t>
+            </a:r>
+          </a:p>
+          <a:p>
+            <a:endParaRPr lang="en-US" dirty="0" smtClean="0"/>
+          </a:p>
+          <a:p>
+            <a:r>
+              <a:rPr lang="en-US" dirty="0" smtClean="0"/>
+              <a:t>(Next slide, then come back). </a:t>
+            </a:r>
+          </a:p>
+          <a:p>
+            <a:r>
+              <a:rPr lang="en-US" dirty="0" smtClean="0"/>
+              <a:t>This is tricky, how do we balance judgment</a:t>
+            </a:r>
+            <a:r>
+              <a:rPr lang="en-US" baseline="0" dirty="0" smtClean="0"/>
+              <a:t> and mercy?</a:t>
+            </a:r>
+          </a:p>
+          <a:p>
+            <a:endParaRPr lang="en-US" baseline="0" dirty="0" smtClean="0"/>
+          </a:p>
+          <a:p>
+            <a:r>
+              <a:rPr lang="en-US" dirty="0" smtClean="0"/>
+              <a:t>Very rarely do people have a problem with your logic. Unless they're wearing a fedora, then they're an internet atheist and think you might possibly be the bottom of the intellectual barrel. But then again, they're wearing a fedora. So….</a:t>
+            </a:r>
+          </a:p>
+          <a:p>
+            <a:endParaRPr lang="en-US" dirty="0" smtClean="0"/>
+          </a:p>
+          <a:p>
+            <a:r>
+              <a:rPr lang="en-US" dirty="0" smtClean="0"/>
+              <a:t>You’re representing</a:t>
+            </a:r>
+            <a:r>
+              <a:rPr lang="en-US" baseline="0" dirty="0" smtClean="0"/>
+              <a:t> the person and temperament of Jesus Christ, carry that burden with honor and humility. </a:t>
+            </a:r>
+            <a:endParaRPr lang="en-US" dirty="0" smtClean="0"/>
+          </a:p>
+        </p:txBody>
+      </p:sp>
+      <p:sp>
+        <p:nvSpPr>
+          <p:cNvPr id="4" name="Slide Number Placeholder 3"/>
+          <p:cNvSpPr>
+            <a:spLocks noGrp="1"/>
+          </p:cNvSpPr>
+          <p:nvPr>
+            <p:ph type="sldNum" sz="quarter" idx="10"/>
+          </p:nvPr>
+        </p:nvSpPr>
+        <p:spPr/>
+        <p:txBody>
+          <a:bodyPr/>
+          <a:lstStyle/>
+          <a:p>
+            <a:fld id="{F4B9BD19-34E0-3045-A049-005FB9714FDF}" type="slidenum">
+              <a:rPr lang="en-US" smtClean="0"/>
+              <a:t>30</a:t>
+            </a:fld>
+            <a:endParaRPr lang="en-US"/>
+          </a:p>
+        </p:txBody>
+      </p:sp>
+    </p:spTree>
+    <p:extLst>
+      <p:ext uri="{BB962C8B-B14F-4D97-AF65-F5344CB8AC3E}">
+        <p14:creationId xmlns:p14="http://schemas.microsoft.com/office/powerpoint/2010/main" val="1115069727"/>
+      </p:ext>
+    </p:extLst>
+  </p:cSld>
+  <p:clrMapOvr>
+    <a:masterClrMapping/>
+  </p:clrMapOvr>
+</p:notes>
+</file>
+
+<file path=ppt/notesSlides/notesSlide26.xml><?xml version="1.0" encoding="utf-8"?>
+<p:notes xmlns:a="http://schemas.openxmlformats.org/drawingml/2006/main" xmlns:r="http://schemas.openxmlformats.org/officeDocument/2006/relationships" xmlns:p="http://schemas.openxmlformats.org/presentationml/2006/main">
+  <p:cSld>
+    <p:spTree>
+      <p:nvGrpSpPr>
+        <p:cNvPr id="1" name=""/>
+        <p:cNvGrpSpPr/>
+        <p:nvPr/>
+      </p:nvGrpSpPr>
+      <p:grpSpPr>
+        <a:xfrm>
+          <a:off x="0" y="0"/>
+          <a:ext cx="0" cy="0"/>
+          <a:chOff x="0" y="0"/>
+          <a:chExt cx="0" cy="0"/>
+        </a:xfrm>
+      </p:grpSpPr>
+      <p:sp>
+        <p:nvSpPr>
+          <p:cNvPr id="2" name="Slide Image Placeholder 1"/>
+          <p:cNvSpPr>
+            <a:spLocks noGrp="1" noRot="1" noChangeAspect="1"/>
+          </p:cNvSpPr>
+          <p:nvPr>
+            <p:ph type="sldImg"/>
+          </p:nvPr>
+        </p:nvSpPr>
+        <p:spPr/>
+      </p:sp>
+      <p:sp>
+        <p:nvSpPr>
+          <p:cNvPr id="3" name="Notes Placeholder 2"/>
+          <p:cNvSpPr>
+            <a:spLocks noGrp="1"/>
+          </p:cNvSpPr>
+          <p:nvPr>
+            <p:ph type="body" idx="1"/>
+          </p:nvPr>
+        </p:nvSpPr>
+        <p:spPr/>
+        <p:txBody>
+          <a:bodyPr/>
+          <a:lstStyle/>
+          <a:p>
+            <a:r>
+              <a:rPr lang="en-US" dirty="0" smtClean="0"/>
+              <a:t>The classic verse</a:t>
+            </a:r>
+            <a:endParaRPr lang="en-US" dirty="0"/>
+          </a:p>
+        </p:txBody>
+      </p:sp>
+      <p:sp>
+        <p:nvSpPr>
+          <p:cNvPr id="4" name="Slide Number Placeholder 3"/>
+          <p:cNvSpPr>
+            <a:spLocks noGrp="1"/>
+          </p:cNvSpPr>
+          <p:nvPr>
+            <p:ph type="sldNum" sz="quarter" idx="10"/>
+          </p:nvPr>
+        </p:nvSpPr>
+        <p:spPr/>
+        <p:txBody>
+          <a:bodyPr/>
+          <a:lstStyle/>
+          <a:p>
+            <a:fld id="{F4B9BD19-34E0-3045-A049-005FB9714FDF}" type="slidenum">
+              <a:rPr lang="en-US" smtClean="0"/>
+              <a:t>31</a:t>
+            </a:fld>
+            <a:endParaRPr lang="en-US"/>
+          </a:p>
+        </p:txBody>
+      </p:sp>
+    </p:spTree>
+    <p:extLst>
+      <p:ext uri="{BB962C8B-B14F-4D97-AF65-F5344CB8AC3E}">
+        <p14:creationId xmlns:p14="http://schemas.microsoft.com/office/powerpoint/2010/main" val="3551104534"/>
+      </p:ext>
+    </p:extLst>
+  </p:cSld>
+  <p:clrMapOvr>
+    <a:masterClrMapping/>
+  </p:clrMapOvr>
+</p:notes>
+</file>
+
+<file path=ppt/notesSlides/notesSlide27.xml><?xml version="1.0" encoding="utf-8"?>
+<p:notes xmlns:a="http://schemas.openxmlformats.org/drawingml/2006/main" xmlns:r="http://schemas.openxmlformats.org/officeDocument/2006/relationships" xmlns:p="http://schemas.openxmlformats.org/presentationml/2006/main">
+  <p:cSld>
+    <p:spTree>
+      <p:nvGrpSpPr>
+        <p:cNvPr id="1" name=""/>
+        <p:cNvGrpSpPr/>
+        <p:nvPr/>
+      </p:nvGrpSpPr>
+      <p:grpSpPr>
+        <a:xfrm>
+          <a:off x="0" y="0"/>
+          <a:ext cx="0" cy="0"/>
+          <a:chOff x="0" y="0"/>
+          <a:chExt cx="0" cy="0"/>
+        </a:xfrm>
+      </p:grpSpPr>
+      <p:sp>
+        <p:nvSpPr>
+          <p:cNvPr id="2" name="Slide Image Placeholder 1"/>
+          <p:cNvSpPr>
+            <a:spLocks noGrp="1" noRot="1" noChangeAspect="1"/>
+          </p:cNvSpPr>
+          <p:nvPr>
+            <p:ph type="sldImg"/>
+          </p:nvPr>
+        </p:nvSpPr>
+        <p:spPr/>
+      </p:sp>
+      <p:sp>
+        <p:nvSpPr>
+          <p:cNvPr id="3" name="Notes Placeholder 2"/>
+          <p:cNvSpPr>
+            <a:spLocks noGrp="1"/>
+          </p:cNvSpPr>
+          <p:nvPr>
+            <p:ph type="body" idx="1"/>
+          </p:nvPr>
+        </p:nvSpPr>
+        <p:spPr/>
+        <p:txBody>
+          <a:bodyPr/>
+          <a:lstStyle/>
+          <a:p>
+            <a:r>
+              <a:rPr lang="en-US" dirty="0" smtClean="0"/>
+              <a:t>That’s my over</a:t>
+            </a:r>
+            <a:r>
+              <a:rPr lang="en-US" baseline="0" dirty="0" smtClean="0"/>
+              <a:t> arching principle, everything comes second to me preserving my witness until the Spirit of the Lord smashes into the moment.</a:t>
+            </a:r>
+            <a:endParaRPr lang="en-US" dirty="0"/>
+          </a:p>
+        </p:txBody>
+      </p:sp>
+      <p:sp>
+        <p:nvSpPr>
+          <p:cNvPr id="4" name="Slide Number Placeholder 3"/>
+          <p:cNvSpPr>
+            <a:spLocks noGrp="1"/>
+          </p:cNvSpPr>
+          <p:nvPr>
+            <p:ph type="sldNum" sz="quarter" idx="10"/>
+          </p:nvPr>
+        </p:nvSpPr>
+        <p:spPr/>
+        <p:txBody>
+          <a:bodyPr/>
+          <a:lstStyle/>
+          <a:p>
+            <a:fld id="{F4B9BD19-34E0-3045-A049-005FB9714FDF}" type="slidenum">
+              <a:rPr lang="en-US" smtClean="0"/>
+              <a:t>32</a:t>
+            </a:fld>
+            <a:endParaRPr lang="en-US"/>
+          </a:p>
+        </p:txBody>
+      </p:sp>
+    </p:spTree>
+    <p:extLst>
+      <p:ext uri="{BB962C8B-B14F-4D97-AF65-F5344CB8AC3E}">
+        <p14:creationId xmlns:p14="http://schemas.microsoft.com/office/powerpoint/2010/main" val="364045993"/>
+      </p:ext>
+    </p:extLst>
+  </p:cSld>
+  <p:clrMapOvr>
+    <a:masterClrMapping/>
+  </p:clrMapOvr>
+</p:notes>
+</file>
+
 <file path=ppt/notesSlides/notesSlide3.xml><?xml version="1.0" encoding="utf-8"?>
 <p:notes xmlns:a="http://schemas.openxmlformats.org/drawingml/2006/main" xmlns:r="http://schemas.openxmlformats.org/officeDocument/2006/relationships" xmlns:p="http://schemas.openxmlformats.org/presentationml/2006/main">
   <p:cSld>
@@ -1551,7 +2784,24 @@
           <a:p>
             <a:r>
               <a:rPr lang="en-US" dirty="0" smtClean="0"/>
-              <a:t>What’s your definition.</a:t>
+              <a:t>What’s your definition</a:t>
+            </a:r>
+            <a:r>
+              <a:rPr lang="en-US" dirty="0" smtClean="0"/>
+              <a:t>.</a:t>
+            </a:r>
+          </a:p>
+          <a:p>
+            <a:endParaRPr lang="en-US" dirty="0" smtClean="0"/>
+          </a:p>
+          <a:p>
+            <a:r>
+              <a:rPr lang="en-US" dirty="0" smtClean="0"/>
+              <a:t>Do this with your neighbor,</a:t>
+            </a:r>
+            <a:r>
+              <a:rPr lang="en-US" baseline="0" dirty="0" smtClean="0"/>
+              <a:t> ask and ye shall receive.</a:t>
             </a:r>
             <a:endParaRPr lang="en-US" dirty="0"/>
           </a:p>
@@ -1639,7 +2889,15 @@
           <a:p>
             <a:r>
               <a:rPr lang="en-US" dirty="0" smtClean="0"/>
-              <a:t>What are we trying to do here?</a:t>
+              <a:t>This is where we’re starting from;</a:t>
+            </a:r>
+            <a:r>
+              <a:rPr lang="en-US" baseline="0" dirty="0" smtClean="0"/>
+              <a:t> a</a:t>
+            </a:r>
+            <a:r>
+              <a:rPr lang="en-US" dirty="0" smtClean="0"/>
+              <a:t>s much as we’d like it to be otherwise.</a:t>
             </a:r>
             <a:endParaRPr lang="en-US" dirty="0"/>
           </a:p>
@@ -1662,7 +2920,7 @@
           <a:p>
             <a:fld id="{F4B9BD19-34E0-3045-A049-005FB9714FDF}" type="slidenum">
               <a:rPr lang="en-US" smtClean="0"/>
-              <a:t>9</a:t>
+              <a:t>7</a:t>
             </a:fld>
             <a:endParaRPr lang="en-US"/>
           </a:p>
@@ -1671,7 +2929,7 @@
     </p:spTree>
     <p:extLst>
       <p:ext uri="{BB962C8B-B14F-4D97-AF65-F5344CB8AC3E}">
-        <p14:creationId xmlns:p14="http://schemas.microsoft.com/office/powerpoint/2010/main" val="3493600589"/>
+        <p14:creationId xmlns:p14="http://schemas.microsoft.com/office/powerpoint/2010/main" val="785232288"/>
       </p:ext>
     </p:extLst>
   </p:cSld>
@@ -1727,11 +2985,24 @@
           <a:p>
             <a:r>
               <a:rPr lang="en-US" dirty="0" smtClean="0"/>
-              <a:t>These</a:t>
+              <a:t>What are we trying to do here</a:t>
+            </a:r>
+            <a:r>
+              <a:rPr lang="en-US" dirty="0" smtClean="0"/>
+              <a:t>?</a:t>
+            </a:r>
+          </a:p>
+          <a:p>
+            <a:endParaRPr lang="en-US" dirty="0" smtClean="0"/>
+          </a:p>
+          <a:p>
+            <a:r>
+              <a:rPr lang="en-US" dirty="0" smtClean="0"/>
+              <a:t>It’s important to figure out what we’re about, in</a:t>
             </a:r>
             <a:r>
               <a:rPr lang="en-US" baseline="0" dirty="0" smtClean="0"/>
-              <a:t> are some phrases that have come up in the last year.</a:t>
+              <a:t> order to figure out where we do next.</a:t>
             </a:r>
             <a:endParaRPr lang="en-US" dirty="0"/>
           </a:p>
@@ -1754,7 +3025,7 @@
           <a:p>
             <a:fld id="{F4B9BD19-34E0-3045-A049-005FB9714FDF}" type="slidenum">
               <a:rPr lang="en-US" smtClean="0"/>
-              <a:t>10</a:t>
+              <a:t>9</a:t>
             </a:fld>
             <a:endParaRPr lang="en-US"/>
           </a:p>
@@ -1763,7 +3034,7 @@
     </p:spTree>
     <p:extLst>
       <p:ext uri="{BB962C8B-B14F-4D97-AF65-F5344CB8AC3E}">
-        <p14:creationId xmlns:p14="http://schemas.microsoft.com/office/powerpoint/2010/main" val="2428854343"/>
+        <p14:creationId xmlns:p14="http://schemas.microsoft.com/office/powerpoint/2010/main" val="3493600589"/>
       </p:ext>
     </p:extLst>
   </p:cSld>
@@ -1819,29 +3090,11 @@
           <a:p>
             <a:r>
               <a:rPr lang="en-US" dirty="0" smtClean="0"/>
-              <a:t>Interesting.</a:t>
-            </a:r>
-          </a:p>
-          <a:p>
-            <a:endParaRPr lang="en-US" dirty="0" smtClean="0"/>
-          </a:p>
-          <a:p>
-            <a:r>
-              <a:rPr lang="en-US" dirty="0" smtClean="0"/>
-              <a:t>So</a:t>
+              <a:t>For me, I think the answer</a:t>
             </a:r>
             <a:r>
               <a:rPr lang="en-US" baseline="0" dirty="0" smtClean="0"/>
-              <a:t> the question is, how do we actually do apologetics in the real world? How to we witness, minister and apologize to the people around us.</a:t>
-            </a:r>
-          </a:p>
-          <a:p>
-            <a:endParaRPr lang="en-US" baseline="0" dirty="0" smtClean="0"/>
-          </a:p>
-          <a:p>
-            <a:r>
-              <a:rPr lang="en-US" baseline="0" dirty="0" smtClean="0"/>
-              <a:t>How do we do so in a way that’s relevant to the world we live in? How do we change cultures?</a:t>
+              <a:t> is simple. So let’s look at a few reasons that have come to my mind in the past couple of days.</a:t>
             </a:r>
             <a:endParaRPr lang="en-US" dirty="0"/>
           </a:p>
@@ -1864,7 +3117,7 @@
           <a:p>
             <a:fld id="{F4B9BD19-34E0-3045-A049-005FB9714FDF}" type="slidenum">
               <a:rPr lang="en-US" smtClean="0"/>
-              <a:t>13</a:t>
+              <a:t>10</a:t>
             </a:fld>
             <a:endParaRPr lang="en-US"/>
           </a:p>
@@ -1873,7 +3126,7 @@
     </p:spTree>
     <p:extLst>
       <p:ext uri="{BB962C8B-B14F-4D97-AF65-F5344CB8AC3E}">
-        <p14:creationId xmlns:p14="http://schemas.microsoft.com/office/powerpoint/2010/main" val="1948308310"/>
+        <p14:creationId xmlns:p14="http://schemas.microsoft.com/office/powerpoint/2010/main" val="2189744034"/>
       </p:ext>
     </p:extLst>
   </p:cSld>
@@ -1929,11 +3182,11 @@
           <a:p>
             <a:r>
               <a:rPr lang="en-US" dirty="0" smtClean="0"/>
-              <a:t>Nothing fancy,</a:t>
+              <a:t>Why be such</a:t>
             </a:r>
             <a:r>
               <a:rPr lang="en-US" baseline="0" dirty="0" smtClean="0"/>
-              <a:t> just some things I’ve learned over the past few years, both from experience, and through divine inspiration.</a:t>
+              <a:t> a dick? </a:t>
             </a:r>
             <a:endParaRPr lang="en-US" dirty="0"/>
           </a:p>
@@ -1956,7 +3209,7 @@
           <a:p>
             <a:fld id="{F4B9BD19-34E0-3045-A049-005FB9714FDF}" type="slidenum">
               <a:rPr lang="en-US" smtClean="0"/>
-              <a:t>14</a:t>
+              <a:t>11</a:t>
             </a:fld>
             <a:endParaRPr lang="en-US"/>
           </a:p>
@@ -1965,7 +3218,7 @@
     </p:spTree>
     <p:extLst>
       <p:ext uri="{BB962C8B-B14F-4D97-AF65-F5344CB8AC3E}">
-        <p14:creationId xmlns:p14="http://schemas.microsoft.com/office/powerpoint/2010/main" val="615740299"/>
+        <p14:creationId xmlns:p14="http://schemas.microsoft.com/office/powerpoint/2010/main" val="4287722604"/>
       </p:ext>
     </p:extLst>
   </p:cSld>
@@ -2021,42 +3274,11 @@
           <a:p>
             <a:r>
               <a:rPr lang="en-US" dirty="0" smtClean="0"/>
-              <a:t>Their words belie a deeper reality</a:t>
-            </a:r>
-          </a:p>
-          <a:p>
-            <a:endParaRPr lang="en-US" dirty="0" smtClean="0"/>
-          </a:p>
-          <a:p>
-            <a:r>
-              <a:rPr lang="en-US" dirty="0" smtClean="0"/>
-              <a:t>This</a:t>
+              <a:t>Somebody</a:t>
             </a:r>
             <a:r>
               <a:rPr lang="en-US" baseline="0" dirty="0" smtClean="0"/>
-              <a:t> freaks people out, because they can’t explain how they feel, or what they mean.</a:t>
-            </a:r>
-          </a:p>
-          <a:p>
-            <a:endParaRPr lang="en-US" baseline="0" dirty="0" smtClean="0"/>
-          </a:p>
-          <a:p>
-            <a:r>
-              <a:rPr lang="en-US" dirty="0" smtClean="0"/>
-              <a:t>(Anyone</a:t>
-            </a:r>
-            <a:r>
-              <a:rPr lang="en-US" baseline="0" dirty="0" smtClean="0"/>
-              <a:t> read Flatland?) (Summary) It’s an analog to our world, people have no idea how to handle the divine.</a:t>
-            </a:r>
-          </a:p>
-          <a:p>
-            <a:endParaRPr lang="en-US" baseline="0" dirty="0" smtClean="0"/>
-          </a:p>
-          <a:p>
-            <a:r>
-              <a:rPr lang="en-US" baseline="0" dirty="0" smtClean="0"/>
-              <a:t>This goes to the nature of language, it’s a mirror and interpreter of the world around us, thus it’s naturally deficient in the supernatural realm.</a:t>
+              <a:t> forgot to tell the Reverend. </a:t>
             </a:r>
             <a:endParaRPr lang="en-US" dirty="0"/>
           </a:p>
@@ -2079,7 +3301,7 @@
           <a:p>
             <a:fld id="{F4B9BD19-34E0-3045-A049-005FB9714FDF}" type="slidenum">
               <a:rPr lang="en-US" smtClean="0"/>
-              <a:t>15</a:t>
+              <a:t>12</a:t>
             </a:fld>
             <a:endParaRPr lang="en-US"/>
           </a:p>
@@ -2088,7 +3310,7 @@
     </p:spTree>
     <p:extLst>
       <p:ext uri="{BB962C8B-B14F-4D97-AF65-F5344CB8AC3E}">
-        <p14:creationId xmlns:p14="http://schemas.microsoft.com/office/powerpoint/2010/main" val="3407028232"/>
+        <p14:creationId xmlns:p14="http://schemas.microsoft.com/office/powerpoint/2010/main" val="2558261999"/>
       </p:ext>
     </p:extLst>
   </p:cSld>
@@ -2143,29 +3365,21 @@
           <a:lstStyle/>
           <a:p>
             <a:r>
-              <a:rPr lang="en-US" dirty="0" smtClean="0"/>
-              <a:t>In the </a:t>
-            </a:r>
-            <a:r>
               <a:rPr lang="en-US" dirty="0" err="1" smtClean="0"/>
-              <a:t>midwest</a:t>
-            </a:r>
-            <a:r>
-              <a:rPr lang="en-US" dirty="0" smtClean="0"/>
-              <a:t>, the structures and institutions of a culture of faith and still around. They may be decaying, but they're still there. If you leave here, you may not find that to be the case. That makes faith really hard, not because we're weak or unfaithful, but because our believes and ideas exist within a framework of community, and if that community suddenly vanishes, it's hard to know what to do next. </a:t>
-            </a:r>
-          </a:p>
-          <a:p>
-            <a:endParaRPr lang="en-US" dirty="0" smtClean="0"/>
-          </a:p>
-          <a:p>
-            <a:r>
-              <a:rPr lang="en-US" dirty="0" smtClean="0"/>
-              <a:t>It’s easy</a:t>
+              <a:t>Kintsugi</a:t>
             </a:r>
             <a:r>
               <a:rPr lang="en-US" baseline="0" dirty="0" smtClean="0"/>
-              <a:t> to be a Christian here (sort of), it’s harder to be a Christian out there. It grinds on your (sometimes a great notion)</a:t>
+              <a:t> is a Japanese word that means to knit broken pottery back together using gold.</a:t>
+            </a:r>
+          </a:p>
+          <a:p>
+            <a:endParaRPr lang="en-US" baseline="0" dirty="0" smtClean="0"/>
+          </a:p>
+          <a:p>
+            <a:r>
+              <a:rPr lang="en-US" baseline="0" dirty="0" smtClean="0"/>
+              <a:t>Screw you Ben, screw you. </a:t>
             </a:r>
             <a:endParaRPr lang="en-US" dirty="0"/>
           </a:p>
@@ -2188,7 +3402,7 @@
           <a:p>
             <a:fld id="{F4B9BD19-34E0-3045-A049-005FB9714FDF}" type="slidenum">
               <a:rPr lang="en-US" smtClean="0"/>
-              <a:t>16</a:t>
+              <a:t>13</a:t>
             </a:fld>
             <a:endParaRPr lang="en-US"/>
           </a:p>
@@ -2197,7 +3411,7 @@
     </p:spTree>
     <p:extLst>
       <p:ext uri="{BB962C8B-B14F-4D97-AF65-F5344CB8AC3E}">
-        <p14:creationId xmlns:p14="http://schemas.microsoft.com/office/powerpoint/2010/main" val="2973207228"/>
+        <p14:creationId xmlns:p14="http://schemas.microsoft.com/office/powerpoint/2010/main" val="2444008947"/>
       </p:ext>
     </p:extLst>
   </p:cSld>
@@ -2444,7 +3658,7 @@
           <a:p>
             <a:fld id="{2069C06D-4ED8-42C6-905D-CA84CA1B6CBF}" type="datetime2">
               <a:rPr lang="en-US" smtClean="0"/>
-              <a:t>Tuesday, October 22, 13</a:t>
+              <a:t>Wednesday, April 8, 15</a:t>
             </a:fld>
             <a:endParaRPr lang="en-US" dirty="0"/>
           </a:p>
@@ -2615,7 +3829,7 @@
           <a:p>
             <a:fld id="{A56EEE0E-EDB0-4D84-86B0-50833DF22902}" type="datetime2">
               <a:rPr lang="en-US" smtClean="0"/>
-              <a:t>Tuesday, October 22, 13</a:t>
+              <a:t>Wednesday, April 8, 15</a:t>
             </a:fld>
             <a:endParaRPr lang="en-US"/>
           </a:p>
@@ -2791,7 +4005,7 @@
           <a:p>
             <a:fld id="{5114372C-B5AB-4C39-B273-B99224EB4DD5}" type="datetime2">
               <a:rPr lang="en-US" smtClean="0"/>
-              <a:t>Tuesday, October 22, 13</a:t>
+              <a:t>Wednesday, April 8, 15</a:t>
             </a:fld>
             <a:endParaRPr lang="en-US"/>
           </a:p>
@@ -2957,7 +4171,7 @@
           <a:p>
             <a:fld id="{14CB1CAA-32CD-4B55-B92A-B8F0843CACF4}" type="datetime2">
               <a:rPr lang="en-US" smtClean="0"/>
-              <a:t>Tuesday, October 22, 13</a:t>
+              <a:t>Wednesday, April 8, 15</a:t>
             </a:fld>
             <a:endParaRPr lang="en-US" dirty="0"/>
           </a:p>
@@ -3215,7 +4429,7 @@
           <a:p>
             <a:fld id="{3AD8CDC4-3D19-4983-B478-82F6B8E5AB66}" type="datetime2">
               <a:rPr lang="en-US" smtClean="0"/>
-              <a:t>Tuesday, October 22, 13</a:t>
+              <a:t>Wednesday, April 8, 15</a:t>
             </a:fld>
             <a:endParaRPr lang="en-US" dirty="0"/>
           </a:p>
@@ -3356,7 +4570,7 @@
           <a:p>
             <a:fld id="{84B82477-D5D3-4181-8C11-75D0F2433A87}" type="datetime2">
               <a:rPr lang="en-US" smtClean="0"/>
-              <a:t>Tuesday, October 22, 13</a:t>
+              <a:t>Wednesday, April 8, 15</a:t>
             </a:fld>
             <a:endParaRPr lang="en-US" dirty="0"/>
           </a:p>
@@ -4007,7 +5221,7 @@
           <a:p>
             <a:fld id="{213E253B-1893-4367-8BAE-DF4BC10DC578}" type="datetime2">
               <a:rPr lang="en-US" smtClean="0"/>
-              <a:t>Tuesday, October 22, 13</a:t>
+              <a:t>Wednesday, April 8, 15</a:t>
             </a:fld>
             <a:endParaRPr lang="en-US" dirty="0"/>
           </a:p>
@@ -4121,7 +5335,7 @@
           <a:p>
             <a:fld id="{8B62300D-25B3-4603-86C9-4CB776489F00}" type="datetime2">
               <a:rPr lang="en-US" smtClean="0"/>
-              <a:t>Tuesday, October 22, 13</a:t>
+              <a:t>Wednesday, April 8, 15</a:t>
             </a:fld>
             <a:endParaRPr lang="en-US" dirty="0"/>
           </a:p>
@@ -4212,7 +5426,7 @@
           <a:p>
             <a:fld id="{C6314AD9-FCC8-48B7-B85B-012A91320DFF}" type="datetime2">
               <a:rPr lang="en-US" smtClean="0"/>
-              <a:t>Tuesday, October 22, 13</a:t>
+              <a:t>Wednesday, April 8, 15</a:t>
             </a:fld>
             <a:endParaRPr lang="en-US" dirty="0"/>
           </a:p>
@@ -4503,7 +5717,7 @@
           <a:p>
             <a:fld id="{3182DC50-D5DB-4F94-B367-9876CD2C4012}" type="datetime2">
               <a:rPr lang="en-US" smtClean="0"/>
-              <a:t>Tuesday, October 22, 13</a:t>
+              <a:t>Wednesday, April 8, 15</a:t>
             </a:fld>
             <a:endParaRPr lang="en-US" dirty="0"/>
           </a:p>
@@ -4827,7 +6041,7 @@
           <a:p>
             <a:fld id="{292EB412-E790-42EA-81FE-2925D3A43D91}" type="datetime2">
               <a:rPr lang="en-US" smtClean="0"/>
-              <a:t>Tuesday, October 22, 13</a:t>
+              <a:t>Wednesday, April 8, 15</a:t>
             </a:fld>
             <a:endParaRPr lang="en-US" dirty="0"/>
           </a:p>
@@ -5285,7 +6499,7 @@
           <a:p>
             <a:fld id="{0B385921-A91A-409C-921C-0E0EC1E750EC}" type="datetime2">
               <a:rPr lang="en-US" smtClean="0"/>
-              <a:t>Tuesday, October 22, 13</a:t>
+              <a:t>Wednesday, April 8, 15</a:t>
             </a:fld>
             <a:endParaRPr lang="en-US" dirty="0"/>
           </a:p>
@@ -5882,30 +7096,7 @@
       </p:grpSpPr>
       <p:sp>
         <p:nvSpPr>
-          <p:cNvPr id="4" name="Text Placeholder 3"/>
-          <p:cNvSpPr>
-            <a:spLocks noGrp="1"/>
-          </p:cNvSpPr>
-          <p:nvPr>
-            <p:ph type="body" idx="1"/>
-          </p:nvPr>
-        </p:nvSpPr>
-        <p:spPr/>
-        <p:txBody>
-          <a:bodyPr/>
-          <a:lstStyle/>
-          <a:p>
-            <a:r>
-              <a:rPr lang="en-US" dirty="0" smtClean="0"/>
-              <a:t>What would you say?</a:t>
-            </a:r>
-            <a:endParaRPr lang="en-US" dirty="0"/>
-          </a:p>
-        </p:txBody>
-      </p:sp>
-      <p:sp>
-        <p:nvSpPr>
-          <p:cNvPr id="3" name="Title 2"/>
+          <p:cNvPr id="2" name="Title 1"/>
           <p:cNvSpPr>
             <a:spLocks noGrp="1"/>
           </p:cNvSpPr>
@@ -5920,7 +7111,7 @@
           <a:p>
             <a:r>
               <a:rPr lang="en-US" dirty="0" smtClean="0"/>
-              <a:t>A quick game</a:t>
+              <a:t>People need this.</a:t>
             </a:r>
             <a:endParaRPr lang="en-US" dirty="0"/>
           </a:p>
@@ -5929,7 +7120,7 @@
     </p:spTree>
     <p:extLst>
       <p:ext uri="{BB962C8B-B14F-4D97-AF65-F5344CB8AC3E}">
-        <p14:creationId xmlns:p14="http://schemas.microsoft.com/office/powerpoint/2010/main" val="1753879067"/>
+        <p14:creationId xmlns:p14="http://schemas.microsoft.com/office/powerpoint/2010/main" val="1053051579"/>
       </p:ext>
     </p:extLst>
   </p:cSld>
@@ -5965,7 +7156,96 @@
       </p:grpSpPr>
       <p:sp>
         <p:nvSpPr>
-          <p:cNvPr id="4" name="Title 3"/>
+          <p:cNvPr id="4" name="Content Placeholder 3"/>
+          <p:cNvSpPr>
+            <a:spLocks noGrp="1"/>
+          </p:cNvSpPr>
+          <p:nvPr>
+            <p:ph idx="1"/>
+          </p:nvPr>
+        </p:nvSpPr>
+        <p:spPr/>
+        <p:txBody>
+          <a:bodyPr/>
+          <a:lstStyle/>
+          <a:p>
+            <a:pPr marL="18288" indent="0">
+              <a:buNone/>
+            </a:pPr>
+            <a:r>
+              <a:rPr lang="en-US" dirty="0" smtClean="0"/>
+              <a:t>It’s either quite a master plan.</a:t>
+            </a:r>
+          </a:p>
+          <a:p>
+            <a:pPr marL="18288" indent="0">
+              <a:buNone/>
+            </a:pPr>
+            <a:r>
+              <a:rPr lang="en-US" dirty="0" smtClean="0"/>
+              <a:t>Or just chemicals that help us understand.</a:t>
+            </a:r>
+          </a:p>
+          <a:p>
+            <a:pPr marL="18288" indent="0">
+              <a:buNone/>
+            </a:pPr>
+            <a:r>
+              <a:rPr lang="en-US" dirty="0" smtClean="0"/>
+              <a:t>That when our hearts stop ticking.</a:t>
+            </a:r>
+          </a:p>
+          <a:p>
+            <a:pPr marL="18288" indent="0">
+              <a:buNone/>
+            </a:pPr>
+            <a:r>
+              <a:rPr lang="en-US" dirty="0" smtClean="0"/>
+              <a:t>This is the end, there’s nothing past this. </a:t>
+            </a:r>
+            <a:endParaRPr lang="en-US" dirty="0"/>
+          </a:p>
+        </p:txBody>
+      </p:sp>
+      <p:sp>
+        <p:nvSpPr>
+          <p:cNvPr id="5" name="Text Placeholder 4"/>
+          <p:cNvSpPr>
+            <a:spLocks noGrp="1"/>
+          </p:cNvSpPr>
+          <p:nvPr>
+            <p:ph type="body" sz="half" idx="2"/>
+          </p:nvPr>
+        </p:nvSpPr>
+        <p:spPr/>
+        <p:txBody>
+          <a:bodyPr/>
+          <a:lstStyle/>
+          <a:p>
+            <a:r>
+              <a:rPr lang="en-US" i="1" dirty="0" smtClean="0"/>
+              <a:t>St. Peter’s Cathedral</a:t>
+            </a:r>
+            <a:endParaRPr lang="en-US" dirty="0" smtClean="0"/>
+          </a:p>
+          <a:p>
+            <a:r>
+              <a:rPr lang="en-US" dirty="0" smtClean="0"/>
+              <a:t>Death Cab for Cutie</a:t>
+            </a:r>
+          </a:p>
+          <a:p>
+            <a:r>
+              <a:rPr lang="en-US" dirty="0" smtClean="0"/>
+              <a:t>(Codes and Keys, 2011)</a:t>
+            </a:r>
+            <a:endParaRPr lang="en-US" dirty="0"/>
+          </a:p>
+        </p:txBody>
+      </p:sp>
+      <p:sp>
+        <p:nvSpPr>
+          <p:cNvPr id="3" name="Title 2"/>
           <p:cNvSpPr>
             <a:spLocks noGrp="1"/>
           </p:cNvSpPr>
@@ -5978,18 +7258,14 @@
           <a:bodyPr/>
           <a:lstStyle/>
           <a:p>
-            <a:r>
-              <a:rPr lang="en-US" dirty="0" smtClean="0"/>
-              <a:t>I make my own morality.</a:t>
-            </a:r>
-            <a:endParaRPr lang="en-US" dirty="0"/>
+            <a:endParaRPr lang="en-US"/>
           </a:p>
         </p:txBody>
       </p:sp>
     </p:spTree>
     <p:extLst>
       <p:ext uri="{BB962C8B-B14F-4D97-AF65-F5344CB8AC3E}">
-        <p14:creationId xmlns:p14="http://schemas.microsoft.com/office/powerpoint/2010/main" val="2411391582"/>
+        <p14:creationId xmlns:p14="http://schemas.microsoft.com/office/powerpoint/2010/main" val="1566475182"/>
       </p:ext>
     </p:extLst>
   </p:cSld>
@@ -6023,33 +7299,40 @@
           <a:chExt cx="0" cy="0"/>
         </a:xfrm>
       </p:grpSpPr>
-      <p:sp>
-        <p:nvSpPr>
-          <p:cNvPr id="2" name="Title 1"/>
-          <p:cNvSpPr>
-            <a:spLocks noGrp="1"/>
-          </p:cNvSpPr>
-          <p:nvPr>
-            <p:ph type="title"/>
-          </p:nvPr>
-        </p:nvSpPr>
-        <p:spPr/>
-        <p:txBody>
-          <a:bodyPr/>
-          <a:lstStyle/>
-          <a:p>
-            <a:r>
-              <a:rPr lang="en-US" dirty="0" smtClean="0"/>
-              <a:t>People don’t have souls.</a:t>
-            </a:r>
-            <a:endParaRPr lang="en-US" dirty="0"/>
-          </a:p>
-        </p:txBody>
-      </p:sp>
+      <p:pic>
+        <p:nvPicPr>
+          <p:cNvPr id="8" name="Picture Placeholder 7" descr="Tombstone_for_Martin_Luther_King_&amp;_Coretta_Scott_King_at_MLK_Historic_Site_in_Atlanta.JPG"/>
+          <p:cNvPicPr>
+            <a:picLocks noGrp="1" noChangeAspect="1"/>
+          </p:cNvPicPr>
+          <p:nvPr>
+            <p:ph type="pic" idx="1"/>
+          </p:nvPr>
+        </p:nvPicPr>
+        <p:blipFill>
+          <a:blip r:embed="rId3" cstate="print">
+            <a:extLst>
+              <a:ext uri="{28A0092B-C50C-407E-A947-70E740481C1C}">
+                <a14:useLocalDpi xmlns:a14="http://schemas.microsoft.com/office/drawing/2010/main" val="0"/>
+              </a:ext>
+            </a:extLst>
+          </a:blip>
+          <a:srcRect t="24684" b="24684"/>
+          <a:stretch>
+            <a:fillRect/>
+          </a:stretch>
+        </p:blipFill>
+        <p:spPr>
+          <a:xfrm>
+            <a:off x="-1232094" y="891910"/>
+            <a:ext cx="11040816" cy="4193628"/>
+          </a:xfrm>
+        </p:spPr>
+      </p:pic>
     </p:spTree>
     <p:extLst>
       <p:ext uri="{BB962C8B-B14F-4D97-AF65-F5344CB8AC3E}">
-        <p14:creationId xmlns:p14="http://schemas.microsoft.com/office/powerpoint/2010/main" val="4055703689"/>
+        <p14:creationId xmlns:p14="http://schemas.microsoft.com/office/powerpoint/2010/main" val="3667437047"/>
       </p:ext>
     </p:extLst>
   </p:cSld>
@@ -6085,7 +7368,85 @@
       </p:grpSpPr>
       <p:sp>
         <p:nvSpPr>
-          <p:cNvPr id="2" name="Title 1"/>
+          <p:cNvPr id="4" name="Content Placeholder 3"/>
+          <p:cNvSpPr>
+            <a:spLocks noGrp="1"/>
+          </p:cNvSpPr>
+          <p:nvPr>
+            <p:ph idx="1"/>
+          </p:nvPr>
+        </p:nvSpPr>
+        <p:spPr/>
+        <p:txBody>
+          <a:bodyPr/>
+          <a:lstStyle/>
+          <a:p>
+            <a:pPr marL="18288" indent="0">
+              <a:buNone/>
+            </a:pPr>
+            <a:r>
+              <a:rPr lang="en-US" dirty="0" smtClean="0"/>
+              <a:t>The only stars I see in the sky, they don’t move me.</a:t>
+            </a:r>
+          </a:p>
+          <a:p>
+            <a:pPr marL="18288" indent="0">
+              <a:buNone/>
+            </a:pPr>
+            <a:r>
+              <a:rPr lang="en-US" dirty="0" smtClean="0"/>
+              <a:t>Cause they’ve all been dead for millions of years, they’re just light diffusing.</a:t>
+            </a:r>
+            <a:endParaRPr lang="en-US" dirty="0"/>
+          </a:p>
+        </p:txBody>
+      </p:sp>
+      <p:sp>
+        <p:nvSpPr>
+          <p:cNvPr id="5" name="Text Placeholder 4"/>
+          <p:cNvSpPr>
+            <a:spLocks noGrp="1"/>
+          </p:cNvSpPr>
+          <p:nvPr>
+            <p:ph type="body" sz="half" idx="2"/>
+          </p:nvPr>
+        </p:nvSpPr>
+        <p:spPr/>
+        <p:txBody>
+          <a:bodyPr/>
+          <a:lstStyle/>
+          <a:p>
+            <a:r>
+              <a:rPr lang="en-US" i="1" dirty="0" smtClean="0"/>
+              <a:t>Everything's a Ceiling</a:t>
+            </a:r>
+          </a:p>
+          <a:p>
+            <a:r>
+              <a:rPr lang="en-US" dirty="0" smtClean="0"/>
+              <a:t>Death Cab for Cutie</a:t>
+            </a:r>
+          </a:p>
+          <a:p>
+            <a:r>
+              <a:rPr lang="en-US" dirty="0" smtClean="0"/>
+              <a:t>(</a:t>
+            </a:r>
+            <a:r>
+              <a:rPr lang="en-US" dirty="0" err="1" smtClean="0"/>
+              <a:t>Kintsugi</a:t>
+            </a:r>
+            <a:r>
+              <a:rPr lang="en-US" dirty="0" smtClean="0"/>
+              <a:t>,  2015)</a:t>
+            </a:r>
+            <a:endParaRPr lang="en-US" dirty="0"/>
+          </a:p>
+        </p:txBody>
+      </p:sp>
+      <p:sp>
+        <p:nvSpPr>
+          <p:cNvPr id="6" name="Title 5"/>
           <p:cNvSpPr>
             <a:spLocks noGrp="1"/>
           </p:cNvSpPr>
@@ -6098,18 +7459,14 @@
           <a:bodyPr/>
           <a:lstStyle/>
           <a:p>
-            <a:r>
-              <a:rPr lang="en-US" dirty="0" smtClean="0"/>
-              <a:t>Most wars are caused by religion.</a:t>
-            </a:r>
-            <a:endParaRPr lang="en-US" dirty="0"/>
+            <a:endParaRPr lang="en-US"/>
           </a:p>
         </p:txBody>
       </p:sp>
     </p:spTree>
     <p:extLst>
       <p:ext uri="{BB962C8B-B14F-4D97-AF65-F5344CB8AC3E}">
-        <p14:creationId xmlns:p14="http://schemas.microsoft.com/office/powerpoint/2010/main" val="1418761157"/>
+        <p14:creationId xmlns:p14="http://schemas.microsoft.com/office/powerpoint/2010/main" val="2693379864"/>
       </p:ext>
     </p:extLst>
   </p:cSld>
@@ -6145,6 +7502,341 @@
       </p:grpSpPr>
       <p:sp>
         <p:nvSpPr>
+          <p:cNvPr id="2" name="Content Placeholder 1"/>
+          <p:cNvSpPr>
+            <a:spLocks noGrp="1"/>
+          </p:cNvSpPr>
+          <p:nvPr>
+            <p:ph idx="1"/>
+          </p:nvPr>
+        </p:nvSpPr>
+        <p:spPr/>
+        <p:txBody>
+          <a:bodyPr/>
+          <a:lstStyle/>
+          <a:p>
+            <a:pPr marL="18288" indent="0">
+              <a:buNone/>
+            </a:pPr>
+            <a:r>
+              <a:rPr lang="en-US" dirty="0" smtClean="0"/>
+              <a:t>We take it equally for granted that a person who is not affected by the vision of earth and sky, who has no eyes to see the grandeur of nature and to sense the sublime, however vaguely, is not human.</a:t>
+            </a:r>
+            <a:endParaRPr lang="en-US" dirty="0"/>
+          </a:p>
+        </p:txBody>
+      </p:sp>
+      <p:sp>
+        <p:nvSpPr>
+          <p:cNvPr id="3" name="Text Placeholder 2"/>
+          <p:cNvSpPr>
+            <a:spLocks noGrp="1"/>
+          </p:cNvSpPr>
+          <p:nvPr>
+            <p:ph type="body" sz="half" idx="2"/>
+          </p:nvPr>
+        </p:nvSpPr>
+        <p:spPr/>
+        <p:txBody>
+          <a:bodyPr/>
+          <a:lstStyle/>
+          <a:p>
+            <a:r>
+              <a:rPr lang="en-US" i="1" dirty="0" smtClean="0"/>
+              <a:t>Man is Not Alone: A Philosophy of Religion</a:t>
+            </a:r>
+            <a:endParaRPr lang="en-US" dirty="0" smtClean="0"/>
+          </a:p>
+          <a:p>
+            <a:r>
+              <a:rPr lang="en-US" dirty="0" smtClean="0"/>
+              <a:t>Rabbi Abraham J. Heschel, 1951</a:t>
+            </a:r>
+            <a:endParaRPr lang="en-US" dirty="0"/>
+          </a:p>
+        </p:txBody>
+      </p:sp>
+      <p:sp>
+        <p:nvSpPr>
+          <p:cNvPr id="4" name="Title 3"/>
+          <p:cNvSpPr>
+            <a:spLocks noGrp="1"/>
+          </p:cNvSpPr>
+          <p:nvPr>
+            <p:ph type="title"/>
+          </p:nvPr>
+        </p:nvSpPr>
+        <p:spPr/>
+        <p:txBody>
+          <a:bodyPr/>
+          <a:lstStyle/>
+          <a:p>
+            <a:endParaRPr lang="en-US"/>
+          </a:p>
+        </p:txBody>
+      </p:sp>
+    </p:spTree>
+    <p:extLst>
+      <p:ext uri="{BB962C8B-B14F-4D97-AF65-F5344CB8AC3E}">
+        <p14:creationId xmlns:p14="http://schemas.microsoft.com/office/powerpoint/2010/main" val="3040417034"/>
+      </p:ext>
+    </p:extLst>
+  </p:cSld>
+  <p:clrMapOvr>
+    <a:masterClrMapping/>
+  </p:clrMapOvr>
+  <p:timing>
+    <p:tnLst>
+      <p:par>
+        <p:cTn xmlns:p14="http://schemas.microsoft.com/office/powerpoint/2010/main" id="1" dur="indefinite" restart="never" nodeType="tmRoot"/>
+      </p:par>
+    </p:tnLst>
+  </p:timing>
+</p:sld>
+</file>
+
+<file path=ppt/slides/slide15.xml><?xml version="1.0" encoding="utf-8"?>
+<p:sld xmlns:a="http://schemas.openxmlformats.org/drawingml/2006/main" xmlns:r="http://schemas.openxmlformats.org/officeDocument/2006/relationships" xmlns:p="http://schemas.openxmlformats.org/presentationml/2006/main">
+  <p:cSld>
+    <p:spTree>
+      <p:nvGrpSpPr>
+        <p:cNvPr id="1" name=""/>
+        <p:cNvGrpSpPr/>
+        <p:nvPr/>
+      </p:nvGrpSpPr>
+      <p:grpSpPr>
+        <a:xfrm>
+          <a:off x="0" y="0"/>
+          <a:ext cx="0" cy="0"/>
+          <a:chOff x="0" y="0"/>
+          <a:chExt cx="0" cy="0"/>
+        </a:xfrm>
+      </p:grpSpPr>
+      <p:sp>
+        <p:nvSpPr>
+          <p:cNvPr id="4" name="Content Placeholder 3"/>
+          <p:cNvSpPr>
+            <a:spLocks noGrp="1"/>
+          </p:cNvSpPr>
+          <p:nvPr>
+            <p:ph idx="1"/>
+          </p:nvPr>
+        </p:nvSpPr>
+        <p:spPr/>
+        <p:txBody>
+          <a:bodyPr/>
+          <a:lstStyle/>
+          <a:p>
+            <a:pPr marL="18288" indent="0">
+              <a:buNone/>
+            </a:pPr>
+            <a:r>
+              <a:rPr lang="en-US" dirty="0" smtClean="0"/>
+              <a:t>I don’t believe in God, but I miss him.</a:t>
+            </a:r>
+            <a:endParaRPr lang="en-US" dirty="0"/>
+          </a:p>
+        </p:txBody>
+      </p:sp>
+      <p:sp>
+        <p:nvSpPr>
+          <p:cNvPr id="5" name="Text Placeholder 4"/>
+          <p:cNvSpPr>
+            <a:spLocks noGrp="1"/>
+          </p:cNvSpPr>
+          <p:nvPr>
+            <p:ph type="body" sz="half" idx="2"/>
+          </p:nvPr>
+        </p:nvSpPr>
+        <p:spPr/>
+        <p:txBody>
+          <a:bodyPr/>
+          <a:lstStyle/>
+          <a:p>
+            <a:r>
+              <a:rPr lang="en-US" i="1" dirty="0" smtClean="0"/>
+              <a:t>Nothing to be Frightened Of</a:t>
+            </a:r>
+          </a:p>
+          <a:p>
+            <a:r>
+              <a:rPr lang="en-US" dirty="0" smtClean="0"/>
+              <a:t>Julian Barnes, 2008</a:t>
+            </a:r>
+            <a:endParaRPr lang="en-US" dirty="0"/>
+          </a:p>
+        </p:txBody>
+      </p:sp>
+      <p:sp>
+        <p:nvSpPr>
+          <p:cNvPr id="3" name="Title 2"/>
+          <p:cNvSpPr>
+            <a:spLocks noGrp="1"/>
+          </p:cNvSpPr>
+          <p:nvPr>
+            <p:ph type="title"/>
+          </p:nvPr>
+        </p:nvSpPr>
+        <p:spPr/>
+        <p:txBody>
+          <a:bodyPr/>
+          <a:lstStyle/>
+          <a:p>
+            <a:endParaRPr lang="en-US"/>
+          </a:p>
+        </p:txBody>
+      </p:sp>
+    </p:spTree>
+    <p:extLst>
+      <p:ext uri="{BB962C8B-B14F-4D97-AF65-F5344CB8AC3E}">
+        <p14:creationId xmlns:p14="http://schemas.microsoft.com/office/powerpoint/2010/main" val="120882760"/>
+      </p:ext>
+    </p:extLst>
+  </p:cSld>
+  <p:clrMapOvr>
+    <a:masterClrMapping/>
+  </p:clrMapOvr>
+  <p:timing>
+    <p:tnLst>
+      <p:par>
+        <p:cTn xmlns:p14="http://schemas.microsoft.com/office/powerpoint/2010/main" id="1" dur="indefinite" restart="never" nodeType="tmRoot"/>
+      </p:par>
+    </p:tnLst>
+  </p:timing>
+</p:sld>
+</file>
+
+<file path=ppt/slides/slide16.xml><?xml version="1.0" encoding="utf-8"?>
+<p:sld xmlns:a="http://schemas.openxmlformats.org/drawingml/2006/main" xmlns:r="http://schemas.openxmlformats.org/officeDocument/2006/relationships" xmlns:p="http://schemas.openxmlformats.org/presentationml/2006/main">
+  <p:cSld>
+    <p:spTree>
+      <p:nvGrpSpPr>
+        <p:cNvPr id="1" name=""/>
+        <p:cNvGrpSpPr/>
+        <p:nvPr/>
+      </p:nvGrpSpPr>
+      <p:grpSpPr>
+        <a:xfrm>
+          <a:off x="0" y="0"/>
+          <a:ext cx="0" cy="0"/>
+          <a:chOff x="0" y="0"/>
+          <a:chExt cx="0" cy="0"/>
+        </a:xfrm>
+      </p:grpSpPr>
+      <p:sp>
+        <p:nvSpPr>
+          <p:cNvPr id="2" name="Content Placeholder 1"/>
+          <p:cNvSpPr>
+            <a:spLocks noGrp="1"/>
+          </p:cNvSpPr>
+          <p:nvPr>
+            <p:ph idx="1"/>
+          </p:nvPr>
+        </p:nvSpPr>
+        <p:spPr/>
+        <p:txBody>
+          <a:bodyPr/>
+          <a:lstStyle/>
+          <a:p>
+            <a:pPr marL="18288" indent="0">
+              <a:buNone/>
+            </a:pPr>
+            <a:r>
+              <a:rPr lang="en-US" dirty="0" smtClean="0"/>
+              <a:t>The world in its grandeur is full of a spiritual radiance, for which we have neither name nor concept.</a:t>
+            </a:r>
+            <a:endParaRPr lang="en-US" dirty="0"/>
+          </a:p>
+        </p:txBody>
+      </p:sp>
+      <p:sp>
+        <p:nvSpPr>
+          <p:cNvPr id="3" name="Text Placeholder 2"/>
+          <p:cNvSpPr>
+            <a:spLocks noGrp="1"/>
+          </p:cNvSpPr>
+          <p:nvPr>
+            <p:ph type="body" sz="half" idx="2"/>
+          </p:nvPr>
+        </p:nvSpPr>
+        <p:spPr/>
+        <p:txBody>
+          <a:bodyPr/>
+          <a:lstStyle/>
+          <a:p>
+            <a:r>
+              <a:rPr lang="en-US" i="1" dirty="0" smtClean="0"/>
+              <a:t>Man is Not Alone: A Philosophy of Religion</a:t>
+            </a:r>
+            <a:endParaRPr lang="en-US" dirty="0" smtClean="0"/>
+          </a:p>
+          <a:p>
+            <a:r>
+              <a:rPr lang="en-US" dirty="0" smtClean="0"/>
+              <a:t>Rabbi Abraham J. Heschel, 1951</a:t>
+            </a:r>
+            <a:endParaRPr lang="en-US" dirty="0"/>
+          </a:p>
+        </p:txBody>
+      </p:sp>
+      <p:sp>
+        <p:nvSpPr>
+          <p:cNvPr id="4" name="Title 3"/>
+          <p:cNvSpPr>
+            <a:spLocks noGrp="1"/>
+          </p:cNvSpPr>
+          <p:nvPr>
+            <p:ph type="title"/>
+          </p:nvPr>
+        </p:nvSpPr>
+        <p:spPr/>
+        <p:txBody>
+          <a:bodyPr/>
+          <a:lstStyle/>
+          <a:p>
+            <a:endParaRPr lang="en-US"/>
+          </a:p>
+        </p:txBody>
+      </p:sp>
+    </p:spTree>
+    <p:extLst>
+      <p:ext uri="{BB962C8B-B14F-4D97-AF65-F5344CB8AC3E}">
+        <p14:creationId xmlns:p14="http://schemas.microsoft.com/office/powerpoint/2010/main" val="2075582306"/>
+      </p:ext>
+    </p:extLst>
+  </p:cSld>
+  <p:clrMapOvr>
+    <a:masterClrMapping/>
+  </p:clrMapOvr>
+  <p:timing>
+    <p:tnLst>
+      <p:par>
+        <p:cTn xmlns:p14="http://schemas.microsoft.com/office/powerpoint/2010/main" id="1" dur="indefinite" restart="never" nodeType="tmRoot"/>
+      </p:par>
+    </p:tnLst>
+  </p:timing>
+</p:sld>
+</file>
+
+<file path=ppt/slides/slide17.xml><?xml version="1.0" encoding="utf-8"?>
+<p:sld xmlns:a="http://schemas.openxmlformats.org/drawingml/2006/main" xmlns:r="http://schemas.openxmlformats.org/officeDocument/2006/relationships" xmlns:p="http://schemas.openxmlformats.org/presentationml/2006/main" show="0">
+  <p:cSld>
+    <p:spTree>
+      <p:nvGrpSpPr>
+        <p:cNvPr id="1" name=""/>
+        <p:cNvGrpSpPr/>
+        <p:nvPr/>
+      </p:nvGrpSpPr>
+      <p:grpSpPr>
+        <a:xfrm>
+          <a:off x="0" y="0"/>
+          <a:ext cx="0" cy="0"/>
+          <a:chOff x="0" y="0"/>
+          <a:chExt cx="0" cy="0"/>
+        </a:xfrm>
+      </p:grpSpPr>
+      <p:sp>
+        <p:nvSpPr>
           <p:cNvPr id="4" name="Text Placeholder 3"/>
           <p:cNvSpPr>
             <a:spLocks noGrp="1"/>
@@ -6160,6 +7852,384 @@
           <a:p>
             <a:r>
               <a:rPr lang="en-US" dirty="0" smtClean="0"/>
+              <a:t>What would you say?</a:t>
+            </a:r>
+            <a:endParaRPr lang="en-US" dirty="0"/>
+          </a:p>
+        </p:txBody>
+      </p:sp>
+      <p:sp>
+        <p:nvSpPr>
+          <p:cNvPr id="3" name="Title 2"/>
+          <p:cNvSpPr>
+            <a:spLocks noGrp="1"/>
+          </p:cNvSpPr>
+          <p:nvPr>
+            <p:ph type="title"/>
+          </p:nvPr>
+        </p:nvSpPr>
+        <p:spPr/>
+        <p:txBody>
+          <a:bodyPr/>
+          <a:lstStyle/>
+          <a:p>
+            <a:r>
+              <a:rPr lang="en-US" dirty="0" smtClean="0"/>
+              <a:t>A quick game</a:t>
+            </a:r>
+            <a:endParaRPr lang="en-US" dirty="0"/>
+          </a:p>
+        </p:txBody>
+      </p:sp>
+    </p:spTree>
+    <p:extLst>
+      <p:ext uri="{BB962C8B-B14F-4D97-AF65-F5344CB8AC3E}">
+        <p14:creationId xmlns:p14="http://schemas.microsoft.com/office/powerpoint/2010/main" val="1753879067"/>
+      </p:ext>
+    </p:extLst>
+  </p:cSld>
+  <p:clrMapOvr>
+    <a:masterClrMapping/>
+  </p:clrMapOvr>
+  <mc:AlternateContent xmlns:mc="http://schemas.openxmlformats.org/markup-compatibility/2006">
+    <mc:Choice xmlns:p14="http://schemas.microsoft.com/office/powerpoint/2010/main" Requires="p14">
+      <p:transition spd="slow" p14:dur="2000"/>
+    </mc:Choice>
+    <mc:Fallback>
+      <p:transition xmlns:p14="http://schemas.microsoft.com/office/powerpoint/2010/main" spd="slow"/>
+    </mc:Fallback>
+  </mc:AlternateContent>
+  <p:timing>
+    <p:tnLst>
+      <p:par>
+        <p:cTn xmlns:p14="http://schemas.microsoft.com/office/powerpoint/2010/main" id="1" dur="indefinite" restart="never" nodeType="tmRoot"/>
+      </p:par>
+    </p:tnLst>
+  </p:timing>
+</p:sld>
+</file>
+
+<file path=ppt/slides/slide18.xml><?xml version="1.0" encoding="utf-8"?>
+<p:sld xmlns:a="http://schemas.openxmlformats.org/drawingml/2006/main" xmlns:r="http://schemas.openxmlformats.org/officeDocument/2006/relationships" xmlns:p="http://schemas.openxmlformats.org/presentationml/2006/main" show="0">
+  <p:cSld>
+    <p:spTree>
+      <p:nvGrpSpPr>
+        <p:cNvPr id="1" name=""/>
+        <p:cNvGrpSpPr/>
+        <p:nvPr/>
+      </p:nvGrpSpPr>
+      <p:grpSpPr>
+        <a:xfrm>
+          <a:off x="0" y="0"/>
+          <a:ext cx="0" cy="0"/>
+          <a:chOff x="0" y="0"/>
+          <a:chExt cx="0" cy="0"/>
+        </a:xfrm>
+      </p:grpSpPr>
+      <p:sp>
+        <p:nvSpPr>
+          <p:cNvPr id="4" name="Title 3"/>
+          <p:cNvSpPr>
+            <a:spLocks noGrp="1"/>
+          </p:cNvSpPr>
+          <p:nvPr>
+            <p:ph type="title"/>
+          </p:nvPr>
+        </p:nvSpPr>
+        <p:spPr/>
+        <p:txBody>
+          <a:bodyPr/>
+          <a:lstStyle/>
+          <a:p>
+            <a:r>
+              <a:rPr lang="en-US" dirty="0" smtClean="0"/>
+              <a:t>I make my own morality.</a:t>
+            </a:r>
+            <a:endParaRPr lang="en-US" dirty="0"/>
+          </a:p>
+        </p:txBody>
+      </p:sp>
+    </p:spTree>
+    <p:extLst>
+      <p:ext uri="{BB962C8B-B14F-4D97-AF65-F5344CB8AC3E}">
+        <p14:creationId xmlns:p14="http://schemas.microsoft.com/office/powerpoint/2010/main" val="2411391582"/>
+      </p:ext>
+    </p:extLst>
+  </p:cSld>
+  <p:clrMapOvr>
+    <a:masterClrMapping/>
+  </p:clrMapOvr>
+  <mc:AlternateContent xmlns:mc="http://schemas.openxmlformats.org/markup-compatibility/2006">
+    <mc:Choice xmlns:p14="http://schemas.microsoft.com/office/powerpoint/2010/main" Requires="p14">
+      <p:transition spd="slow" p14:dur="2000"/>
+    </mc:Choice>
+    <mc:Fallback>
+      <p:transition xmlns:p14="http://schemas.microsoft.com/office/powerpoint/2010/main" spd="slow"/>
+    </mc:Fallback>
+  </mc:AlternateContent>
+  <p:timing>
+    <p:tnLst>
+      <p:par>
+        <p:cTn xmlns:p14="http://schemas.microsoft.com/office/powerpoint/2010/main" id="1" dur="indefinite" restart="never" nodeType="tmRoot"/>
+      </p:par>
+    </p:tnLst>
+  </p:timing>
+</p:sld>
+</file>
+
+<file path=ppt/slides/slide19.xml><?xml version="1.0" encoding="utf-8"?>
+<p:sld xmlns:a="http://schemas.openxmlformats.org/drawingml/2006/main" xmlns:r="http://schemas.openxmlformats.org/officeDocument/2006/relationships" xmlns:p="http://schemas.openxmlformats.org/presentationml/2006/main" show="0">
+  <p:cSld>
+    <p:spTree>
+      <p:nvGrpSpPr>
+        <p:cNvPr id="1" name=""/>
+        <p:cNvGrpSpPr/>
+        <p:nvPr/>
+      </p:nvGrpSpPr>
+      <p:grpSpPr>
+        <a:xfrm>
+          <a:off x="0" y="0"/>
+          <a:ext cx="0" cy="0"/>
+          <a:chOff x="0" y="0"/>
+          <a:chExt cx="0" cy="0"/>
+        </a:xfrm>
+      </p:grpSpPr>
+      <p:sp>
+        <p:nvSpPr>
+          <p:cNvPr id="2" name="Title 1"/>
+          <p:cNvSpPr>
+            <a:spLocks noGrp="1"/>
+          </p:cNvSpPr>
+          <p:nvPr>
+            <p:ph type="title"/>
+          </p:nvPr>
+        </p:nvSpPr>
+        <p:spPr/>
+        <p:txBody>
+          <a:bodyPr/>
+          <a:lstStyle/>
+          <a:p>
+            <a:r>
+              <a:rPr lang="en-US" dirty="0" smtClean="0"/>
+              <a:t>People don’t have souls.</a:t>
+            </a:r>
+            <a:endParaRPr lang="en-US" dirty="0"/>
+          </a:p>
+        </p:txBody>
+      </p:sp>
+    </p:spTree>
+    <p:extLst>
+      <p:ext uri="{BB962C8B-B14F-4D97-AF65-F5344CB8AC3E}">
+        <p14:creationId xmlns:p14="http://schemas.microsoft.com/office/powerpoint/2010/main" val="4055703689"/>
+      </p:ext>
+    </p:extLst>
+  </p:cSld>
+  <p:clrMapOvr>
+    <a:masterClrMapping/>
+  </p:clrMapOvr>
+  <mc:AlternateContent xmlns:mc="http://schemas.openxmlformats.org/markup-compatibility/2006">
+    <mc:Choice xmlns:p14="http://schemas.microsoft.com/office/powerpoint/2010/main" Requires="p14">
+      <p:transition spd="slow" p14:dur="2000"/>
+    </mc:Choice>
+    <mc:Fallback>
+      <p:transition xmlns:p14="http://schemas.microsoft.com/office/powerpoint/2010/main" spd="slow"/>
+    </mc:Fallback>
+  </mc:AlternateContent>
+  <p:timing>
+    <p:tnLst>
+      <p:par>
+        <p:cTn xmlns:p14="http://schemas.microsoft.com/office/powerpoint/2010/main" id="1" dur="indefinite" restart="never" nodeType="tmRoot"/>
+      </p:par>
+    </p:tnLst>
+  </p:timing>
+</p:sld>
+</file>
+
+<file path=ppt/slides/slide2.xml><?xml version="1.0" encoding="utf-8"?>
+<p:sld xmlns:a="http://schemas.openxmlformats.org/drawingml/2006/main" xmlns:r="http://schemas.openxmlformats.org/officeDocument/2006/relationships" xmlns:p="http://schemas.openxmlformats.org/presentationml/2006/main">
+  <p:cSld>
+    <p:spTree>
+      <p:nvGrpSpPr>
+        <p:cNvPr id="1" name=""/>
+        <p:cNvGrpSpPr/>
+        <p:nvPr/>
+      </p:nvGrpSpPr>
+      <p:grpSpPr>
+        <a:xfrm>
+          <a:off x="0" y="0"/>
+          <a:ext cx="0" cy="0"/>
+          <a:chOff x="0" y="0"/>
+          <a:chExt cx="0" cy="0"/>
+        </a:xfrm>
+      </p:grpSpPr>
+      <p:sp>
+        <p:nvSpPr>
+          <p:cNvPr id="6" name="Text Placeholder 5"/>
+          <p:cNvSpPr>
+            <a:spLocks noGrp="1"/>
+          </p:cNvSpPr>
+          <p:nvPr>
+            <p:ph type="body" idx="1"/>
+          </p:nvPr>
+        </p:nvSpPr>
+        <p:spPr/>
+        <p:txBody>
+          <a:bodyPr/>
+          <a:lstStyle/>
+          <a:p>
+            <a:r>
+              <a:rPr lang="en-US" dirty="0" smtClean="0"/>
+              <a:t>Nick Robison</a:t>
+            </a:r>
+            <a:endParaRPr lang="en-US" dirty="0"/>
+          </a:p>
+        </p:txBody>
+      </p:sp>
+      <p:sp>
+        <p:nvSpPr>
+          <p:cNvPr id="5" name="Title 4"/>
+          <p:cNvSpPr>
+            <a:spLocks noGrp="1"/>
+          </p:cNvSpPr>
+          <p:nvPr>
+            <p:ph type="title"/>
+          </p:nvPr>
+        </p:nvSpPr>
+        <p:spPr/>
+        <p:txBody>
+          <a:bodyPr/>
+          <a:lstStyle/>
+          <a:p>
+            <a:r>
+              <a:rPr lang="en-US" dirty="0" smtClean="0"/>
+              <a:t>Hello, my name is:</a:t>
+            </a:r>
+            <a:endParaRPr lang="en-US" dirty="0"/>
+          </a:p>
+        </p:txBody>
+      </p:sp>
+    </p:spTree>
+    <p:extLst>
+      <p:ext uri="{BB962C8B-B14F-4D97-AF65-F5344CB8AC3E}">
+        <p14:creationId xmlns:p14="http://schemas.microsoft.com/office/powerpoint/2010/main" val="418363910"/>
+      </p:ext>
+    </p:extLst>
+  </p:cSld>
+  <p:clrMapOvr>
+    <a:masterClrMapping/>
+  </p:clrMapOvr>
+  <p:timing>
+    <p:tnLst>
+      <p:par>
+        <p:cTn xmlns:p14="http://schemas.microsoft.com/office/powerpoint/2010/main" id="1" dur="indefinite" restart="never" nodeType="tmRoot"/>
+      </p:par>
+    </p:tnLst>
+  </p:timing>
+</p:sld>
+</file>
+
+<file path=ppt/slides/slide20.xml><?xml version="1.0" encoding="utf-8"?>
+<p:sld xmlns:a="http://schemas.openxmlformats.org/drawingml/2006/main" xmlns:r="http://schemas.openxmlformats.org/officeDocument/2006/relationships" xmlns:p="http://schemas.openxmlformats.org/presentationml/2006/main" show="0">
+  <p:cSld>
+    <p:spTree>
+      <p:nvGrpSpPr>
+        <p:cNvPr id="1" name=""/>
+        <p:cNvGrpSpPr/>
+        <p:nvPr/>
+      </p:nvGrpSpPr>
+      <p:grpSpPr>
+        <a:xfrm>
+          <a:off x="0" y="0"/>
+          <a:ext cx="0" cy="0"/>
+          <a:chOff x="0" y="0"/>
+          <a:chExt cx="0" cy="0"/>
+        </a:xfrm>
+      </p:grpSpPr>
+      <p:sp>
+        <p:nvSpPr>
+          <p:cNvPr id="2" name="Title 1"/>
+          <p:cNvSpPr>
+            <a:spLocks noGrp="1"/>
+          </p:cNvSpPr>
+          <p:nvPr>
+            <p:ph type="title"/>
+          </p:nvPr>
+        </p:nvSpPr>
+        <p:spPr/>
+        <p:txBody>
+          <a:bodyPr/>
+          <a:lstStyle/>
+          <a:p>
+            <a:r>
+              <a:rPr lang="en-US" dirty="0" smtClean="0"/>
+              <a:t>Most wars are caused by religion.</a:t>
+            </a:r>
+            <a:endParaRPr lang="en-US" dirty="0"/>
+          </a:p>
+        </p:txBody>
+      </p:sp>
+    </p:spTree>
+    <p:extLst>
+      <p:ext uri="{BB962C8B-B14F-4D97-AF65-F5344CB8AC3E}">
+        <p14:creationId xmlns:p14="http://schemas.microsoft.com/office/powerpoint/2010/main" val="1418761157"/>
+      </p:ext>
+    </p:extLst>
+  </p:cSld>
+  <p:clrMapOvr>
+    <a:masterClrMapping/>
+  </p:clrMapOvr>
+  <mc:AlternateContent xmlns:mc="http://schemas.openxmlformats.org/markup-compatibility/2006">
+    <mc:Choice xmlns:p14="http://schemas.microsoft.com/office/powerpoint/2010/main" Requires="p14">
+      <p:transition spd="slow" p14:dur="2000"/>
+    </mc:Choice>
+    <mc:Fallback>
+      <p:transition xmlns:p14="http://schemas.microsoft.com/office/powerpoint/2010/main" spd="slow"/>
+    </mc:Fallback>
+  </mc:AlternateContent>
+  <p:timing>
+    <p:tnLst>
+      <p:par>
+        <p:cTn xmlns:p14="http://schemas.microsoft.com/office/powerpoint/2010/main" id="1" dur="indefinite" restart="never" nodeType="tmRoot"/>
+      </p:par>
+    </p:tnLst>
+  </p:timing>
+</p:sld>
+</file>
+
+<file path=ppt/slides/slide21.xml><?xml version="1.0" encoding="utf-8"?>
+<p:sld xmlns:a="http://schemas.openxmlformats.org/drawingml/2006/main" xmlns:r="http://schemas.openxmlformats.org/officeDocument/2006/relationships" xmlns:p="http://schemas.openxmlformats.org/presentationml/2006/main">
+  <p:cSld>
+    <p:spTree>
+      <p:nvGrpSpPr>
+        <p:cNvPr id="1" name=""/>
+        <p:cNvGrpSpPr/>
+        <p:nvPr/>
+      </p:nvGrpSpPr>
+      <p:grpSpPr>
+        <a:xfrm>
+          <a:off x="0" y="0"/>
+          <a:ext cx="0" cy="0"/>
+          <a:chOff x="0" y="0"/>
+          <a:chExt cx="0" cy="0"/>
+        </a:xfrm>
+      </p:grpSpPr>
+      <p:sp>
+        <p:nvSpPr>
+          <p:cNvPr id="4" name="Text Placeholder 3"/>
+          <p:cNvSpPr>
+            <a:spLocks noGrp="1"/>
+          </p:cNvSpPr>
+          <p:nvPr>
+            <p:ph type="body" idx="1"/>
+          </p:nvPr>
+        </p:nvSpPr>
+        <p:spPr/>
+        <p:txBody>
+          <a:bodyPr/>
+          <a:lstStyle/>
+          <a:p>
+            <a:r>
+              <a:rPr lang="en-US" dirty="0" smtClean="0"/>
               <a:t>According to Nick Robison</a:t>
             </a:r>
             <a:endParaRPr lang="en-US" dirty="0"/>
@@ -6183,7 +8253,11 @@
           <a:p>
             <a:r>
               <a:rPr lang="en-US" dirty="0" smtClean="0"/>
-              <a:t>3 Principles of Apologetics</a:t>
+              <a:t>3 Principles of </a:t>
+            </a:r>
+            <a:r>
+              <a:rPr lang="en-US" dirty="0" smtClean="0"/>
+              <a:t>Apologetics™</a:t>
             </a:r>
             <a:endParaRPr lang="en-US" dirty="0"/>
           </a:p>
@@ -6209,7 +8283,7 @@
 </p:sld>
 </file>
 
-<file path=ppt/slides/slide15.xml><?xml version="1.0" encoding="utf-8"?>
+<file path=ppt/slides/slide22.xml><?xml version="1.0" encoding="utf-8"?>
 <p:sld xmlns:a="http://schemas.openxmlformats.org/drawingml/2006/main" xmlns:r="http://schemas.openxmlformats.org/officeDocument/2006/relationships" xmlns:p="http://schemas.openxmlformats.org/presentationml/2006/main">
   <p:cSld>
     <p:spTree>
@@ -6515,7 +8589,7 @@
 </p:sld>
 </file>
 
-<file path=ppt/slides/slide16.xml><?xml version="1.0" encoding="utf-8"?>
+<file path=ppt/slides/slide23.xml><?xml version="1.0" encoding="utf-8"?>
 <p:sld xmlns:a="http://schemas.openxmlformats.org/drawingml/2006/main" xmlns:r="http://schemas.openxmlformats.org/officeDocument/2006/relationships" xmlns:p="http://schemas.openxmlformats.org/presentationml/2006/main">
   <p:cSld>
     <p:spTree>
@@ -6886,7 +8960,7 @@
 </p:sld>
 </file>
 
-<file path=ppt/slides/slide17.xml><?xml version="1.0" encoding="utf-8"?>
+<file path=ppt/slides/slide24.xml><?xml version="1.0" encoding="utf-8"?>
 <p:sld xmlns:a="http://schemas.openxmlformats.org/drawingml/2006/main" xmlns:r="http://schemas.openxmlformats.org/officeDocument/2006/relationships" xmlns:p="http://schemas.openxmlformats.org/presentationml/2006/main">
   <p:cSld>
     <p:spTree>
@@ -7190,7 +9264,7 @@
 </p:sld>
 </file>
 
-<file path=ppt/slides/slide18.xml><?xml version="1.0" encoding="utf-8"?>
+<file path=ppt/slides/slide25.xml><?xml version="1.0" encoding="utf-8"?>
 <p:sld xmlns:a="http://schemas.openxmlformats.org/drawingml/2006/main" xmlns:r="http://schemas.openxmlformats.org/officeDocument/2006/relationships" xmlns:p="http://schemas.openxmlformats.org/presentationml/2006/main">
   <p:cSld>
     <p:spTree>
@@ -7273,7 +9347,7 @@
 </p:sld>
 </file>
 
-<file path=ppt/slides/slide19.xml><?xml version="1.0" encoding="utf-8"?>
+<file path=ppt/slides/slide26.xml><?xml version="1.0" encoding="utf-8"?>
 <p:sld xmlns:a="http://schemas.openxmlformats.org/drawingml/2006/main" xmlns:r="http://schemas.openxmlformats.org/officeDocument/2006/relationships" xmlns:p="http://schemas.openxmlformats.org/presentationml/2006/main">
   <p:cSld>
     <p:spTree>
@@ -7319,7 +9393,7 @@
           <a:p>
             <a:r>
               <a:rPr lang="en-US" dirty="0" smtClean="0"/>
-              <a:t>No on has ever been argued into the kingdom of God, but so many have been kept out by perceived inconsistencies and errors</a:t>
+              <a:t>No on has ever been argued into the kingdom of God, but so many have been kept out by perceived inconsistencies and errors.</a:t>
             </a:r>
           </a:p>
           <a:p>
@@ -7922,90 +9996,7 @@
 </p:sld>
 </file>
 
-<file path=ppt/slides/slide2.xml><?xml version="1.0" encoding="utf-8"?>
-<p:sld xmlns:a="http://schemas.openxmlformats.org/drawingml/2006/main" xmlns:r="http://schemas.openxmlformats.org/officeDocument/2006/relationships" xmlns:p="http://schemas.openxmlformats.org/presentationml/2006/main">
-  <p:cSld>
-    <p:spTree>
-      <p:nvGrpSpPr>
-        <p:cNvPr id="1" name=""/>
-        <p:cNvGrpSpPr/>
-        <p:nvPr/>
-      </p:nvGrpSpPr>
-      <p:grpSpPr>
-        <a:xfrm>
-          <a:off x="0" y="0"/>
-          <a:ext cx="0" cy="0"/>
-          <a:chOff x="0" y="0"/>
-          <a:chExt cx="0" cy="0"/>
-        </a:xfrm>
-      </p:grpSpPr>
-      <p:sp>
-        <p:nvSpPr>
-          <p:cNvPr id="6" name="Text Placeholder 5"/>
-          <p:cNvSpPr>
-            <a:spLocks noGrp="1"/>
-          </p:cNvSpPr>
-          <p:nvPr>
-            <p:ph type="body" idx="1"/>
-          </p:nvPr>
-        </p:nvSpPr>
-        <p:spPr/>
-        <p:txBody>
-          <a:bodyPr/>
-          <a:lstStyle/>
-          <a:p>
-            <a:r>
-              <a:rPr lang="en-US" dirty="0" smtClean="0"/>
-              <a:t>Nick Robison</a:t>
-            </a:r>
-            <a:endParaRPr lang="en-US" dirty="0"/>
-          </a:p>
-        </p:txBody>
-      </p:sp>
-      <p:sp>
-        <p:nvSpPr>
-          <p:cNvPr id="5" name="Title 4"/>
-          <p:cNvSpPr>
-            <a:spLocks noGrp="1"/>
-          </p:cNvSpPr>
-          <p:nvPr>
-            <p:ph type="title"/>
-          </p:nvPr>
-        </p:nvSpPr>
-        <p:spPr/>
-        <p:txBody>
-          <a:bodyPr/>
-          <a:lstStyle/>
-          <a:p>
-            <a:r>
-              <a:rPr lang="en-US" dirty="0" smtClean="0"/>
-              <a:t>Hello, my name is:</a:t>
-            </a:r>
-            <a:endParaRPr lang="en-US" dirty="0"/>
-          </a:p>
-        </p:txBody>
-      </p:sp>
-    </p:spTree>
-    <p:extLst>
-      <p:ext uri="{BB962C8B-B14F-4D97-AF65-F5344CB8AC3E}">
-        <p14:creationId xmlns:p14="http://schemas.microsoft.com/office/powerpoint/2010/main" val="418363910"/>
-      </p:ext>
-    </p:extLst>
-  </p:cSld>
-  <p:clrMapOvr>
-    <a:masterClrMapping/>
-  </p:clrMapOvr>
-  <p:timing>
-    <p:tnLst>
-      <p:par>
-        <p:cTn xmlns:p14="http://schemas.microsoft.com/office/powerpoint/2010/main" id="1" dur="indefinite" restart="never" nodeType="tmRoot"/>
-      </p:par>
-    </p:tnLst>
-  </p:timing>
-</p:sld>
-</file>
-
-<file path=ppt/slides/slide20.xml><?xml version="1.0" encoding="utf-8"?>
+<file path=ppt/slides/slide27.xml><?xml version="1.0" encoding="utf-8"?>
 <p:sld xmlns:a="http://schemas.openxmlformats.org/drawingml/2006/main" xmlns:r="http://schemas.openxmlformats.org/officeDocument/2006/relationships" xmlns:p="http://schemas.openxmlformats.org/presentationml/2006/main">
   <p:cSld>
     <p:spTree>
@@ -8389,7 +10380,7 @@
 </p:sld>
 </file>
 
-<file path=ppt/slides/slide21.xml><?xml version="1.0" encoding="utf-8"?>
+<file path=ppt/slides/slide28.xml><?xml version="1.0" encoding="utf-8"?>
 <p:sld xmlns:a="http://schemas.openxmlformats.org/drawingml/2006/main" xmlns:r="http://schemas.openxmlformats.org/officeDocument/2006/relationships" xmlns:p="http://schemas.openxmlformats.org/presentationml/2006/main">
   <p:cSld>
     <p:spTree>
@@ -8522,7 +10513,7 @@
 </p:sld>
 </file>
 
-<file path=ppt/slides/slide22.xml><?xml version="1.0" encoding="utf-8"?>
+<file path=ppt/slides/slide29.xml><?xml version="1.0" encoding="utf-8"?>
 <p:sld xmlns:a="http://schemas.openxmlformats.org/drawingml/2006/main" xmlns:r="http://schemas.openxmlformats.org/officeDocument/2006/relationships" xmlns:p="http://schemas.openxmlformats.org/presentationml/2006/main">
   <p:cSld>
     <p:spTree>
@@ -8758,7 +10749,283 @@
 </p:sld>
 </file>
 
-<file path=ppt/slides/slide23.xml><?xml version="1.0" encoding="utf-8"?>
+<file path=ppt/slides/slide3.xml><?xml version="1.0" encoding="utf-8"?>
+<p:sld xmlns:a="http://schemas.openxmlformats.org/drawingml/2006/main" xmlns:r="http://schemas.openxmlformats.org/officeDocument/2006/relationships" xmlns:p="http://schemas.openxmlformats.org/presentationml/2006/main">
+  <p:cSld>
+    <p:spTree>
+      <p:nvGrpSpPr>
+        <p:cNvPr id="1" name=""/>
+        <p:cNvGrpSpPr/>
+        <p:nvPr/>
+      </p:nvGrpSpPr>
+      <p:grpSpPr>
+        <a:xfrm>
+          <a:off x="0" y="0"/>
+          <a:ext cx="0" cy="0"/>
+          <a:chOff x="0" y="0"/>
+          <a:chExt cx="0" cy="0"/>
+        </a:xfrm>
+      </p:grpSpPr>
+      <p:sp>
+        <p:nvSpPr>
+          <p:cNvPr id="5" name="Content Placeholder 4"/>
+          <p:cNvSpPr>
+            <a:spLocks noGrp="1"/>
+          </p:cNvSpPr>
+          <p:nvPr>
+            <p:ph idx="1"/>
+          </p:nvPr>
+        </p:nvSpPr>
+        <p:spPr/>
+        <p:txBody>
+          <a:bodyPr/>
+          <a:lstStyle/>
+          <a:p>
+            <a:r>
+              <a:rPr lang="en-US" dirty="0" smtClean="0"/>
+              <a:t>Define our terms</a:t>
+            </a:r>
+          </a:p>
+          <a:p>
+            <a:r>
+              <a:rPr lang="en-US" dirty="0" smtClean="0"/>
+              <a:t>Nicks’ Principles </a:t>
+            </a:r>
+            <a:r>
+              <a:rPr lang="en-US" dirty="0" smtClean="0"/>
+              <a:t>of </a:t>
+            </a:r>
+            <a:r>
+              <a:rPr lang="en-US" dirty="0" smtClean="0"/>
+              <a:t>Apologetics™</a:t>
+            </a:r>
+            <a:endParaRPr lang="en-US" dirty="0" smtClean="0"/>
+          </a:p>
+          <a:p>
+            <a:r>
+              <a:rPr lang="en-US" dirty="0" smtClean="0"/>
+              <a:t>A few humble suggestions</a:t>
+            </a:r>
+          </a:p>
+        </p:txBody>
+      </p:sp>
+      <p:sp>
+        <p:nvSpPr>
+          <p:cNvPr id="4" name="Title 3"/>
+          <p:cNvSpPr>
+            <a:spLocks noGrp="1"/>
+          </p:cNvSpPr>
+          <p:nvPr>
+            <p:ph type="title"/>
+          </p:nvPr>
+        </p:nvSpPr>
+        <p:spPr/>
+        <p:txBody>
+          <a:bodyPr/>
+          <a:lstStyle/>
+          <a:p>
+            <a:r>
+              <a:rPr lang="en-US" dirty="0" smtClean="0"/>
+              <a:t>What we’re going to do today</a:t>
+            </a:r>
+            <a:endParaRPr lang="en-US" dirty="0"/>
+          </a:p>
+        </p:txBody>
+      </p:sp>
+    </p:spTree>
+    <p:extLst>
+      <p:ext uri="{BB962C8B-B14F-4D97-AF65-F5344CB8AC3E}">
+        <p14:creationId xmlns:p14="http://schemas.microsoft.com/office/powerpoint/2010/main" val="58725299"/>
+      </p:ext>
+    </p:extLst>
+  </p:cSld>
+  <p:clrMapOvr>
+    <a:masterClrMapping/>
+  </p:clrMapOvr>
+  <p:timing>
+    <p:tnLst>
+      <p:par>
+        <p:cTn xmlns:p14="http://schemas.microsoft.com/office/powerpoint/2010/main" id="1" dur="indefinite" restart="never" nodeType="tmRoot">
+          <p:childTnLst>
+            <p:seq concurrent="1" nextAc="seek">
+              <p:cTn id="2" dur="indefinite" nodeType="mainSeq">
+                <p:childTnLst>
+                  <p:par>
+                    <p:cTn id="3" fill="hold">
+                      <p:stCondLst>
+                        <p:cond delay="indefinite"/>
+                      </p:stCondLst>
+                      <p:childTnLst>
+                        <p:par>
+                          <p:cTn id="4" fill="hold">
+                            <p:stCondLst>
+                              <p:cond delay="0"/>
+                            </p:stCondLst>
+                            <p:childTnLst>
+                              <p:par>
+                                <p:cTn id="5" presetID="1" presetClass="entr" presetSubtype="0" fill="hold" grpId="0" nodeType="clickEffect">
+                                  <p:stCondLst>
+                                    <p:cond delay="0"/>
+                                  </p:stCondLst>
+                                  <p:childTnLst>
+                                    <p:set>
+                                      <p:cBhvr>
+                                        <p:cTn id="6" dur="1" fill="hold">
+                                          <p:stCondLst>
+                                            <p:cond delay="0"/>
+                                          </p:stCondLst>
+                                        </p:cTn>
+                                        <p:tgtEl>
+                                          <p:spTgt spid="5">
+                                            <p:txEl>
+                                              <p:pRg st="0" end="0"/>
+                                            </p:txEl>
+                                          </p:spTgt>
+                                        </p:tgtEl>
+                                        <p:attrNameLst>
+                                          <p:attrName>style.visibility</p:attrName>
+                                        </p:attrNameLst>
+                                      </p:cBhvr>
+                                      <p:to>
+                                        <p:strVal val="visible"/>
+                                      </p:to>
+                                    </p:set>
+                                  </p:childTnLst>
+                                </p:cTn>
+                              </p:par>
+                            </p:childTnLst>
+                          </p:cTn>
+                        </p:par>
+                      </p:childTnLst>
+                    </p:cTn>
+                  </p:par>
+                  <p:par>
+                    <p:cTn id="7" fill="hold">
+                      <p:stCondLst>
+                        <p:cond delay="indefinite"/>
+                      </p:stCondLst>
+                      <p:childTnLst>
+                        <p:par>
+                          <p:cTn id="8" fill="hold">
+                            <p:stCondLst>
+                              <p:cond delay="0"/>
+                            </p:stCondLst>
+                            <p:childTnLst>
+                              <p:par>
+                                <p:cTn id="9" presetID="1" presetClass="entr" presetSubtype="0" fill="hold" grpId="0" nodeType="clickEffect">
+                                  <p:stCondLst>
+                                    <p:cond delay="0"/>
+                                  </p:stCondLst>
+                                  <p:childTnLst>
+                                    <p:set>
+                                      <p:cBhvr>
+                                        <p:cTn id="10" dur="1" fill="hold">
+                                          <p:stCondLst>
+                                            <p:cond delay="0"/>
+                                          </p:stCondLst>
+                                        </p:cTn>
+                                        <p:tgtEl>
+                                          <p:spTgt spid="5">
+                                            <p:txEl>
+                                              <p:pRg st="1" end="1"/>
+                                            </p:txEl>
+                                          </p:spTgt>
+                                        </p:tgtEl>
+                                        <p:attrNameLst>
+                                          <p:attrName>style.visibility</p:attrName>
+                                        </p:attrNameLst>
+                                      </p:cBhvr>
+                                      <p:to>
+                                        <p:strVal val="visible"/>
+                                      </p:to>
+                                    </p:set>
+                                  </p:childTnLst>
+                                </p:cTn>
+                              </p:par>
+                            </p:childTnLst>
+                          </p:cTn>
+                        </p:par>
+                      </p:childTnLst>
+                    </p:cTn>
+                  </p:par>
+                  <p:par>
+                    <p:cTn id="11" fill="hold">
+                      <p:stCondLst>
+                        <p:cond delay="indefinite"/>
+                      </p:stCondLst>
+                      <p:childTnLst>
+                        <p:par>
+                          <p:cTn id="12" fill="hold">
+                            <p:stCondLst>
+                              <p:cond delay="0"/>
+                            </p:stCondLst>
+                            <p:childTnLst>
+                              <p:par>
+                                <p:cTn id="13" presetID="1" presetClass="entr" presetSubtype="0" fill="hold" grpId="0" nodeType="clickEffect">
+                                  <p:stCondLst>
+                                    <p:cond delay="0"/>
+                                  </p:stCondLst>
+                                  <p:childTnLst>
+                                    <p:set>
+                                      <p:cBhvr>
+                                        <p:cTn id="14" dur="1" fill="hold">
+                                          <p:stCondLst>
+                                            <p:cond delay="0"/>
+                                          </p:stCondLst>
+                                        </p:cTn>
+                                        <p:tgtEl>
+                                          <p:spTgt spid="5">
+                                            <p:txEl>
+                                              <p:pRg st="2" end="2"/>
+                                            </p:txEl>
+                                          </p:spTgt>
+                                        </p:tgtEl>
+                                        <p:attrNameLst>
+                                          <p:attrName>style.visibility</p:attrName>
+                                        </p:attrNameLst>
+                                      </p:cBhvr>
+                                      <p:to>
+                                        <p:strVal val="visible"/>
+                                      </p:to>
+                                    </p:set>
+                                  </p:childTnLst>
+                                </p:cTn>
+                              </p:par>
+                            </p:childTnLst>
+                          </p:cTn>
+                        </p:par>
+                      </p:childTnLst>
+                    </p:cTn>
+                  </p:par>
+                </p:childTnLst>
+              </p:cTn>
+              <p:prevCondLst>
+                <p:cond evt="onPrev" delay="0">
+                  <p:tgtEl>
+                    <p:sldTgt/>
+                  </p:tgtEl>
+                </p:cond>
+              </p:prevCondLst>
+              <p:nextCondLst>
+                <p:cond evt="onNext" delay="0">
+                  <p:tgtEl>
+                    <p:sldTgt/>
+                  </p:tgtEl>
+                </p:cond>
+              </p:nextCondLst>
+            </p:seq>
+          </p:childTnLst>
+        </p:cTn>
+      </p:par>
+    </p:tnLst>
+    <p:bldLst>
+      <p:bldP spid="5" grpId="0" build="p"/>
+    </p:bldLst>
+  </p:timing>
+</p:sld>
+</file>
+
+<file path=ppt/slides/slide30.xml><?xml version="1.0" encoding="utf-8"?>
 <p:sld xmlns:a="http://schemas.openxmlformats.org/drawingml/2006/main" xmlns:r="http://schemas.openxmlformats.org/officeDocument/2006/relationships" xmlns:p="http://schemas.openxmlformats.org/presentationml/2006/main">
   <p:cSld>
     <p:spTree>
@@ -9064,7 +11331,7 @@
 </p:sld>
 </file>
 
-<file path=ppt/slides/slide24.xml><?xml version="1.0" encoding="utf-8"?>
+<file path=ppt/slides/slide31.xml><?xml version="1.0" encoding="utf-8"?>
 <p:sld xmlns:a="http://schemas.openxmlformats.org/drawingml/2006/main" xmlns:r="http://schemas.openxmlformats.org/officeDocument/2006/relationships" xmlns:p="http://schemas.openxmlformats.org/presentationml/2006/main">
   <p:cSld>
     <p:spTree>
@@ -9163,7 +11430,67 @@
 </p:sld>
 </file>
 
-<file path=ppt/slides/slide25.xml><?xml version="1.0" encoding="utf-8"?>
+<file path=ppt/slides/slide32.xml><?xml version="1.0" encoding="utf-8"?>
+<p:sld xmlns:a="http://schemas.openxmlformats.org/drawingml/2006/main" xmlns:r="http://schemas.openxmlformats.org/officeDocument/2006/relationships" xmlns:p="http://schemas.openxmlformats.org/presentationml/2006/main">
+  <p:cSld>
+    <p:spTree>
+      <p:nvGrpSpPr>
+        <p:cNvPr id="1" name=""/>
+        <p:cNvGrpSpPr/>
+        <p:nvPr/>
+      </p:nvGrpSpPr>
+      <p:grpSpPr>
+        <a:xfrm>
+          <a:off x="0" y="0"/>
+          <a:ext cx="0" cy="0"/>
+          <a:chOff x="0" y="0"/>
+          <a:chExt cx="0" cy="0"/>
+        </a:xfrm>
+      </p:grpSpPr>
+      <p:sp>
+        <p:nvSpPr>
+          <p:cNvPr id="3" name="Title 2"/>
+          <p:cNvSpPr>
+            <a:spLocks noGrp="1"/>
+          </p:cNvSpPr>
+          <p:nvPr>
+            <p:ph type="title"/>
+          </p:nvPr>
+        </p:nvSpPr>
+        <p:spPr/>
+        <p:txBody>
+          <a:bodyPr/>
+          <a:lstStyle/>
+          <a:p>
+            <a:r>
+              <a:rPr lang="en-US" dirty="0" smtClean="0"/>
+              <a:t>Shepherd the moments between the in-breaking of the Spirit.</a:t>
+            </a:r>
+            <a:endParaRPr lang="en-US" dirty="0"/>
+          </a:p>
+        </p:txBody>
+      </p:sp>
+    </p:spTree>
+    <p:extLst>
+      <p:ext uri="{BB962C8B-B14F-4D97-AF65-F5344CB8AC3E}">
+        <p14:creationId xmlns:p14="http://schemas.microsoft.com/office/powerpoint/2010/main" val="447551994"/>
+      </p:ext>
+    </p:extLst>
+  </p:cSld>
+  <p:clrMapOvr>
+    <a:masterClrMapping/>
+  </p:clrMapOvr>
+  <p:timing>
+    <p:tnLst>
+      <p:par>
+        <p:cTn xmlns:p14="http://schemas.microsoft.com/office/powerpoint/2010/main" id="1" dur="indefinite" restart="never" nodeType="tmRoot"/>
+      </p:par>
+    </p:tnLst>
+  </p:timing>
+</p:sld>
+</file>
+
+<file path=ppt/slides/slide33.xml><?xml version="1.0" encoding="utf-8"?>
 <p:sld xmlns:a="http://schemas.openxmlformats.org/drawingml/2006/main" xmlns:r="http://schemas.openxmlformats.org/officeDocument/2006/relationships" xmlns:p="http://schemas.openxmlformats.org/presentationml/2006/main">
   <p:cSld>
     <p:spTree>
@@ -9275,7 +11602,7 @@
 </p:sld>
 </file>
 
-<file path=ppt/slides/slide3.xml><?xml version="1.0" encoding="utf-8"?>
+<file path=ppt/slides/slide34.xml><?xml version="1.0" encoding="utf-8"?>
 <p:sld xmlns:a="http://schemas.openxmlformats.org/drawingml/2006/main" xmlns:r="http://schemas.openxmlformats.org/officeDocument/2006/relationships" xmlns:p="http://schemas.openxmlformats.org/presentationml/2006/main">
   <p:cSld>
     <p:spTree>
@@ -9302,33 +11629,202 @@
             <p:ph idx="1"/>
           </p:nvPr>
         </p:nvSpPr>
-        <p:spPr/>
-        <p:txBody>
-          <a:bodyPr/>
-          <a:lstStyle/>
-          <a:p>
-            <a:r>
-              <a:rPr lang="en-US" dirty="0" smtClean="0"/>
-              <a:t>Define our terms</a:t>
-            </a:r>
-          </a:p>
-          <a:p>
-            <a:r>
-              <a:rPr lang="en-US" dirty="0" smtClean="0"/>
-              <a:t>Play a game</a:t>
-            </a:r>
-          </a:p>
-          <a:p>
-            <a:r>
-              <a:rPr lang="en-US" dirty="0" smtClean="0"/>
-              <a:t>Principles of Apologetics</a:t>
-            </a:r>
-          </a:p>
-          <a:p>
-            <a:r>
-              <a:rPr lang="en-US" dirty="0" smtClean="0"/>
-              <a:t>A few humble suggestions</a:t>
-            </a:r>
+        <p:spPr>
+          <a:xfrm>
+            <a:off x="149091" y="685800"/>
+            <a:ext cx="8795199" cy="5105399"/>
+          </a:xfrm>
+        </p:spPr>
+        <p:txBody>
+          <a:bodyPr>
+            <a:normAutofit lnSpcReduction="10000"/>
+          </a:bodyPr>
+          <a:lstStyle/>
+          <a:p>
+            <a:r>
+              <a:rPr lang="en-US" i="1" dirty="0"/>
+              <a:t>Flatland: A Romance of Many Dimensions</a:t>
+            </a:r>
+            <a:r>
+              <a:rPr lang="en-US" dirty="0"/>
+              <a:t> – Edwin </a:t>
+            </a:r>
+            <a:r>
+              <a:rPr lang="en-US" dirty="0" smtClean="0"/>
+              <a:t>Abbott</a:t>
+            </a:r>
+          </a:p>
+          <a:p>
+            <a:r>
+              <a:rPr lang="en-US" i="1" dirty="0" smtClean="0"/>
+              <a:t>Formations of the Secular: Christianity, Islam, Modernity</a:t>
+            </a:r>
+            <a:r>
+              <a:rPr lang="en-US" dirty="0" smtClean="0"/>
+              <a:t> – </a:t>
+            </a:r>
+            <a:r>
+              <a:rPr lang="en-US" dirty="0" err="1" smtClean="0"/>
+              <a:t>Talal</a:t>
+            </a:r>
+            <a:r>
+              <a:rPr lang="en-US" dirty="0" smtClean="0"/>
+              <a:t> </a:t>
+            </a:r>
+            <a:r>
+              <a:rPr lang="en-US" dirty="0" err="1" smtClean="0"/>
+              <a:t>Asad</a:t>
+            </a:r>
+            <a:endParaRPr lang="en-US" i="1" dirty="0" smtClean="0"/>
+          </a:p>
+          <a:p>
+            <a:r>
+              <a:rPr lang="en-US" i="1" dirty="0" smtClean="0"/>
+              <a:t>Nothing </a:t>
+            </a:r>
+            <a:r>
+              <a:rPr lang="en-US" i="1" dirty="0"/>
+              <a:t>To Be Frightened Of</a:t>
+            </a:r>
+            <a:r>
+              <a:rPr lang="en-US" dirty="0"/>
+              <a:t> – Julian </a:t>
+            </a:r>
+            <a:r>
+              <a:rPr lang="en-US" dirty="0" smtClean="0"/>
+              <a:t>Barnes</a:t>
+            </a:r>
+          </a:p>
+          <a:p>
+            <a:r>
+              <a:rPr lang="en-US" i="1" dirty="0" smtClean="0"/>
+              <a:t>Orthodoxy – </a:t>
+            </a:r>
+            <a:r>
+              <a:rPr lang="en-US" dirty="0" smtClean="0"/>
+              <a:t>G.K. Chesterton</a:t>
+            </a:r>
+            <a:endParaRPr lang="en-US" i="1" dirty="0" smtClean="0"/>
+          </a:p>
+          <a:p>
+            <a:r>
+              <a:rPr lang="en-US" i="1" dirty="0" smtClean="0"/>
+              <a:t>Jerusalem’s </a:t>
+            </a:r>
+            <a:r>
+              <a:rPr lang="en-US" i="1" dirty="0"/>
+              <a:t>Claim Against Us</a:t>
+            </a:r>
+            <a:r>
+              <a:rPr lang="en-US" i="1" dirty="0" smtClean="0"/>
+              <a:t>. </a:t>
+            </a:r>
+            <a:r>
+              <a:rPr lang="en-US" dirty="0" smtClean="0"/>
+              <a:t>Louise Cowen </a:t>
+            </a:r>
+            <a:r>
+              <a:rPr lang="en-US" i="1" dirty="0" smtClean="0"/>
+              <a:t> </a:t>
+            </a:r>
+            <a:r>
+              <a:rPr lang="en-US" dirty="0" smtClean="0"/>
+              <a:t>Intercollegiate Review </a:t>
+            </a:r>
+            <a:r>
+              <a:rPr lang="en-US" dirty="0"/>
+              <a:t>2001;36:14–23</a:t>
+            </a:r>
+            <a:r>
+              <a:rPr lang="en-US" dirty="0" smtClean="0"/>
+              <a:t>.</a:t>
+            </a:r>
+          </a:p>
+          <a:p>
+            <a:r>
+              <a:rPr lang="en-US" i="1" dirty="0" smtClean="0"/>
+              <a:t>The Brothers Karamazov</a:t>
+            </a:r>
+            <a:r>
+              <a:rPr lang="en-US" dirty="0" smtClean="0"/>
+              <a:t> – Fyodor Dostoevsky</a:t>
+            </a:r>
+            <a:endParaRPr lang="en-US" i="1" dirty="0" smtClean="0"/>
+          </a:p>
+          <a:p>
+            <a:r>
+              <a:rPr lang="en-US" i="1" dirty="0" smtClean="0"/>
+              <a:t>Man Is Not Alone: A Philosophy of Religion </a:t>
+            </a:r>
+            <a:r>
+              <a:rPr lang="en-US" dirty="0" smtClean="0"/>
+              <a:t>– Abraham J. Heschel</a:t>
+            </a:r>
+          </a:p>
+          <a:p>
+            <a:r>
+              <a:rPr lang="en-US" i="1" dirty="0" smtClean="0"/>
+              <a:t>God In Search of Man: A Philosophy of Judaism</a:t>
+            </a:r>
+            <a:r>
+              <a:rPr lang="en-US" dirty="0" smtClean="0"/>
+              <a:t> – Abraham J. Heschel</a:t>
+            </a:r>
+          </a:p>
+          <a:p>
+            <a:r>
+              <a:rPr lang="en-US" i="1" dirty="0" smtClean="0"/>
+              <a:t>Sometimes a Great Notion</a:t>
+            </a:r>
+            <a:r>
+              <a:rPr lang="en-US" dirty="0" smtClean="0"/>
+              <a:t> – Ken </a:t>
+            </a:r>
+            <a:r>
+              <a:rPr lang="en-US" dirty="0" err="1" smtClean="0"/>
+              <a:t>Kesey</a:t>
+            </a:r>
+            <a:endParaRPr lang="en-US" dirty="0" smtClean="0"/>
+          </a:p>
+          <a:p>
+            <a:r>
+              <a:rPr lang="en-US" i="1" dirty="0" smtClean="0"/>
+              <a:t>Death on a Friday Afternoon</a:t>
+            </a:r>
+            <a:r>
+              <a:rPr lang="en-US" dirty="0" smtClean="0"/>
+              <a:t> – Richard John </a:t>
+            </a:r>
+            <a:r>
+              <a:rPr lang="en-US" dirty="0" err="1" smtClean="0"/>
+              <a:t>Neuhaus</a:t>
+            </a:r>
+            <a:endParaRPr lang="en-US" dirty="0" smtClean="0"/>
+          </a:p>
+          <a:p>
+            <a:r>
+              <a:rPr lang="en-US" i="1" dirty="0" smtClean="0"/>
+              <a:t>The Responsible Self: An Essay in Christian Moral Philosophy</a:t>
+            </a:r>
+            <a:r>
+              <a:rPr lang="en-US" dirty="0" smtClean="0"/>
+              <a:t> – H. Richard Niebuhr</a:t>
+            </a:r>
+          </a:p>
+          <a:p>
+            <a:r>
+              <a:rPr lang="en-US" i="1" dirty="0" smtClean="0"/>
+              <a:t>Quantum Physics and Theology</a:t>
+            </a:r>
+            <a:r>
+              <a:rPr lang="en-US" dirty="0" smtClean="0"/>
+              <a:t> – John </a:t>
+            </a:r>
+            <a:r>
+              <a:rPr lang="en-US" dirty="0" err="1" smtClean="0"/>
+              <a:t>Polkinghorne</a:t>
+            </a:r>
+            <a:endParaRPr lang="en-US" i="1" dirty="0" smtClean="0"/>
           </a:p>
         </p:txBody>
       </p:sp>
@@ -9342,14 +11838,19 @@
             <p:ph type="title"/>
           </p:nvPr>
         </p:nvSpPr>
-        <p:spPr/>
-        <p:txBody>
-          <a:bodyPr/>
-          <a:lstStyle/>
-          <a:p>
-            <a:r>
-              <a:rPr lang="en-US" dirty="0" smtClean="0"/>
-              <a:t>What we’re going to do today</a:t>
+        <p:spPr>
+          <a:xfrm>
+            <a:off x="149091" y="5791200"/>
+            <a:ext cx="7543800" cy="914400"/>
+          </a:xfrm>
+        </p:spPr>
+        <p:txBody>
+          <a:bodyPr/>
+          <a:lstStyle/>
+          <a:p>
+            <a:r>
+              <a:rPr lang="en-US" dirty="0" smtClean="0"/>
+              <a:t>References</a:t>
             </a:r>
             <a:endParaRPr lang="en-US" dirty="0"/>
           </a:p>
@@ -9358,242 +11859,185 @@
     </p:spTree>
     <p:extLst>
       <p:ext uri="{BB962C8B-B14F-4D97-AF65-F5344CB8AC3E}">
-        <p14:creationId xmlns:p14="http://schemas.microsoft.com/office/powerpoint/2010/main" val="58725299"/>
+        <p14:creationId xmlns:p14="http://schemas.microsoft.com/office/powerpoint/2010/main" val="3343058031"/>
       </p:ext>
     </p:extLst>
   </p:cSld>
   <p:clrMapOvr>
     <a:masterClrMapping/>
   </p:clrMapOvr>
-  <p:timing>
-    <p:tnLst>
-      <p:par>
-        <p:cTn xmlns:p14="http://schemas.microsoft.com/office/powerpoint/2010/main" id="1" dur="indefinite" restart="never" nodeType="tmRoot">
-          <p:childTnLst>
-            <p:seq concurrent="1" nextAc="seek">
-              <p:cTn id="2" dur="indefinite" nodeType="mainSeq">
-                <p:childTnLst>
-                  <p:par>
-                    <p:cTn id="3" fill="hold">
-                      <p:stCondLst>
-                        <p:cond delay="indefinite"/>
-                      </p:stCondLst>
-                      <p:childTnLst>
-                        <p:par>
-                          <p:cTn id="4" fill="hold">
-                            <p:stCondLst>
-                              <p:cond delay="0"/>
-                            </p:stCondLst>
-                            <p:childTnLst>
-                              <p:par>
-                                <p:cTn id="5" presetID="1" presetClass="entr" presetSubtype="0" fill="hold" grpId="0" nodeType="clickEffect">
-                                  <p:stCondLst>
-                                    <p:cond delay="0"/>
-                                  </p:stCondLst>
-                                  <p:childTnLst>
-                                    <p:set>
-                                      <p:cBhvr>
-                                        <p:cTn id="6" dur="1" fill="hold">
-                                          <p:stCondLst>
-                                            <p:cond delay="0"/>
-                                          </p:stCondLst>
-                                        </p:cTn>
-                                        <p:tgtEl>
-                                          <p:spTgt spid="5">
-                                            <p:txEl>
-                                              <p:pRg st="0" end="0"/>
-                                            </p:txEl>
-                                          </p:spTgt>
-                                        </p:tgtEl>
-                                        <p:attrNameLst>
-                                          <p:attrName>style.visibility</p:attrName>
-                                        </p:attrNameLst>
-                                      </p:cBhvr>
-                                      <p:to>
-                                        <p:strVal val="visible"/>
-                                      </p:to>
-                                    </p:set>
-                                  </p:childTnLst>
-                                </p:cTn>
-                              </p:par>
-                            </p:childTnLst>
-                          </p:cTn>
-                        </p:par>
-                      </p:childTnLst>
-                    </p:cTn>
-                  </p:par>
-                  <p:par>
-                    <p:cTn id="7" fill="hold">
-                      <p:stCondLst>
-                        <p:cond delay="indefinite"/>
-                      </p:stCondLst>
-                      <p:childTnLst>
-                        <p:par>
-                          <p:cTn id="8" fill="hold">
-                            <p:stCondLst>
-                              <p:cond delay="0"/>
-                            </p:stCondLst>
-                            <p:childTnLst>
-                              <p:par>
-                                <p:cTn id="9" presetID="1" presetClass="entr" presetSubtype="0" fill="hold" grpId="0" nodeType="clickEffect">
-                                  <p:stCondLst>
-                                    <p:cond delay="0"/>
-                                  </p:stCondLst>
-                                  <p:childTnLst>
-                                    <p:set>
-                                      <p:cBhvr>
-                                        <p:cTn id="10" dur="1" fill="hold">
-                                          <p:stCondLst>
-                                            <p:cond delay="0"/>
-                                          </p:stCondLst>
-                                        </p:cTn>
-                                        <p:tgtEl>
-                                          <p:spTgt spid="5">
-                                            <p:txEl>
-                                              <p:pRg st="1" end="1"/>
-                                            </p:txEl>
-                                          </p:spTgt>
-                                        </p:tgtEl>
-                                        <p:attrNameLst>
-                                          <p:attrName>style.visibility</p:attrName>
-                                        </p:attrNameLst>
-                                      </p:cBhvr>
-                                      <p:to>
-                                        <p:strVal val="visible"/>
-                                      </p:to>
-                                    </p:set>
-                                  </p:childTnLst>
-                                </p:cTn>
-                              </p:par>
-                            </p:childTnLst>
-                          </p:cTn>
-                        </p:par>
-                      </p:childTnLst>
-                    </p:cTn>
-                  </p:par>
-                  <p:par>
-                    <p:cTn id="11" fill="hold">
-                      <p:stCondLst>
-                        <p:cond delay="indefinite"/>
-                      </p:stCondLst>
-                      <p:childTnLst>
-                        <p:par>
-                          <p:cTn id="12" fill="hold">
-                            <p:stCondLst>
-                              <p:cond delay="0"/>
-                            </p:stCondLst>
-                            <p:childTnLst>
-                              <p:par>
-                                <p:cTn id="13" presetID="1" presetClass="entr" presetSubtype="0" fill="hold" grpId="0" nodeType="clickEffect">
-                                  <p:stCondLst>
-                                    <p:cond delay="0"/>
-                                  </p:stCondLst>
-                                  <p:childTnLst>
-                                    <p:set>
-                                      <p:cBhvr>
-                                        <p:cTn id="14" dur="1" fill="hold">
-                                          <p:stCondLst>
-                                            <p:cond delay="0"/>
-                                          </p:stCondLst>
-                                        </p:cTn>
-                                        <p:tgtEl>
-                                          <p:spTgt spid="5">
-                                            <p:txEl>
-                                              <p:pRg st="2" end="2"/>
-                                            </p:txEl>
-                                          </p:spTgt>
-                                        </p:tgtEl>
-                                        <p:attrNameLst>
-                                          <p:attrName>style.visibility</p:attrName>
-                                        </p:attrNameLst>
-                                      </p:cBhvr>
-                                      <p:to>
-                                        <p:strVal val="visible"/>
-                                      </p:to>
-                                    </p:set>
-                                  </p:childTnLst>
-                                </p:cTn>
-                              </p:par>
-                            </p:childTnLst>
-                          </p:cTn>
-                        </p:par>
-                      </p:childTnLst>
-                    </p:cTn>
-                  </p:par>
-                  <p:par>
-                    <p:cTn id="15" fill="hold">
-                      <p:stCondLst>
-                        <p:cond delay="indefinite"/>
-                      </p:stCondLst>
-                      <p:childTnLst>
-                        <p:par>
-                          <p:cTn id="16" fill="hold">
-                            <p:stCondLst>
-                              <p:cond delay="0"/>
-                            </p:stCondLst>
-                            <p:childTnLst>
-                              <p:par>
-                                <p:cTn id="17" presetID="1" presetClass="entr" presetSubtype="0" fill="hold" grpId="0" nodeType="clickEffect">
-                                  <p:stCondLst>
-                                    <p:cond delay="0"/>
-                                  </p:stCondLst>
-                                  <p:childTnLst>
-                                    <p:set>
-                                      <p:cBhvr>
-                                        <p:cTn id="18" dur="1" fill="hold">
-                                          <p:stCondLst>
-                                            <p:cond delay="0"/>
-                                          </p:stCondLst>
-                                        </p:cTn>
-                                        <p:tgtEl>
-                                          <p:spTgt spid="5">
-                                            <p:txEl>
-                                              <p:pRg st="3" end="3"/>
-                                            </p:txEl>
-                                          </p:spTgt>
-                                        </p:tgtEl>
-                                        <p:attrNameLst>
-                                          <p:attrName>style.visibility</p:attrName>
-                                        </p:attrNameLst>
-                                      </p:cBhvr>
-                                      <p:to>
-                                        <p:strVal val="visible"/>
-                                      </p:to>
-                                    </p:set>
-                                  </p:childTnLst>
-                                </p:cTn>
-                              </p:par>
-                            </p:childTnLst>
-                          </p:cTn>
-                        </p:par>
-                      </p:childTnLst>
-                    </p:cTn>
-                  </p:par>
-                </p:childTnLst>
-              </p:cTn>
-              <p:prevCondLst>
-                <p:cond evt="onPrev" delay="0">
-                  <p:tgtEl>
-                    <p:sldTgt/>
-                  </p:tgtEl>
-                </p:cond>
-              </p:prevCondLst>
-              <p:nextCondLst>
-                <p:cond evt="onNext" delay="0">
-                  <p:tgtEl>
-                    <p:sldTgt/>
-                  </p:tgtEl>
-                </p:cond>
-              </p:nextCondLst>
-            </p:seq>
-          </p:childTnLst>
-        </p:cTn>
-      </p:par>
-    </p:tnLst>
-    <p:bldLst>
-      <p:bldP spid="5" grpId="0" build="p"/>
-    </p:bldLst>
-  </p:timing>
+</p:sld>
+</file>
+
+<file path=ppt/slides/slide35.xml><?xml version="1.0" encoding="utf-8"?>
+<p:sld xmlns:a="http://schemas.openxmlformats.org/drawingml/2006/main" xmlns:r="http://schemas.openxmlformats.org/officeDocument/2006/relationships" xmlns:p="http://schemas.openxmlformats.org/presentationml/2006/main">
+  <p:cSld>
+    <p:spTree>
+      <p:nvGrpSpPr>
+        <p:cNvPr id="1" name=""/>
+        <p:cNvGrpSpPr/>
+        <p:nvPr/>
+      </p:nvGrpSpPr>
+      <p:grpSpPr>
+        <a:xfrm>
+          <a:off x="0" y="0"/>
+          <a:ext cx="0" cy="0"/>
+          <a:chOff x="0" y="0"/>
+          <a:chExt cx="0" cy="0"/>
+        </a:xfrm>
+      </p:grpSpPr>
+      <p:sp>
+        <p:nvSpPr>
+          <p:cNvPr id="5" name="Content Placeholder 4"/>
+          <p:cNvSpPr>
+            <a:spLocks noGrp="1"/>
+          </p:cNvSpPr>
+          <p:nvPr>
+            <p:ph idx="1"/>
+          </p:nvPr>
+        </p:nvSpPr>
+        <p:spPr>
+          <a:xfrm>
+            <a:off x="149091" y="685800"/>
+            <a:ext cx="8795199" cy="5105399"/>
+          </a:xfrm>
+        </p:spPr>
+        <p:txBody>
+          <a:bodyPr>
+            <a:normAutofit/>
+          </a:bodyPr>
+          <a:lstStyle/>
+          <a:p>
+            <a:r>
+              <a:rPr lang="en-US" i="1" dirty="0"/>
+              <a:t>How (not) to be Secular –</a:t>
+            </a:r>
+            <a:r>
+              <a:rPr lang="en-US" dirty="0"/>
+              <a:t> James K.A. </a:t>
+            </a:r>
+            <a:r>
+              <a:rPr lang="en-US" dirty="0" smtClean="0"/>
+              <a:t>Smith</a:t>
+            </a:r>
+            <a:endParaRPr lang="en-US" i="1" dirty="0" smtClean="0"/>
+          </a:p>
+          <a:p>
+            <a:r>
+              <a:rPr lang="en-US" i="1" dirty="0" smtClean="0"/>
+              <a:t>Real </a:t>
+            </a:r>
+            <a:r>
+              <a:rPr lang="en-US" i="1" dirty="0"/>
+              <a:t>Presences – </a:t>
+            </a:r>
+            <a:r>
+              <a:rPr lang="en-US" dirty="0"/>
+              <a:t>George </a:t>
+            </a:r>
+            <a:r>
+              <a:rPr lang="en-US" dirty="0" smtClean="0"/>
+              <a:t>Steiner</a:t>
+            </a:r>
+            <a:endParaRPr lang="en-US" i="1" dirty="0" smtClean="0"/>
+          </a:p>
+          <a:p>
+            <a:r>
+              <a:rPr lang="en-US" i="1" dirty="0" smtClean="0"/>
+              <a:t>A </a:t>
+            </a:r>
+            <a:r>
+              <a:rPr lang="en-US" i="1" dirty="0"/>
+              <a:t>Secular Age</a:t>
+            </a:r>
+            <a:r>
+              <a:rPr lang="en-US" dirty="0"/>
+              <a:t> – Charles </a:t>
+            </a:r>
+            <a:r>
+              <a:rPr lang="en-US" dirty="0" smtClean="0"/>
+              <a:t>Taylor</a:t>
+            </a:r>
+            <a:endParaRPr lang="en-US" i="1" dirty="0" smtClean="0"/>
+          </a:p>
+          <a:p>
+            <a:r>
+              <a:rPr lang="en-US" i="1" dirty="0" smtClean="0"/>
+              <a:t>The </a:t>
+            </a:r>
+            <a:r>
+              <a:rPr lang="en-US" i="1" dirty="0"/>
+              <a:t>Company of the Committed – </a:t>
+            </a:r>
+            <a:r>
+              <a:rPr lang="en-US" dirty="0"/>
+              <a:t>Elton </a:t>
+            </a:r>
+            <a:r>
+              <a:rPr lang="en-US" dirty="0" err="1" smtClean="0"/>
+              <a:t>Trueblood</a:t>
+            </a:r>
+            <a:endParaRPr lang="en-US" i="1" dirty="0" smtClean="0"/>
+          </a:p>
+          <a:p>
+            <a:r>
+              <a:rPr lang="en-US" i="1" dirty="0" smtClean="0"/>
+              <a:t>Seek the Welfare of </a:t>
+            </a:r>
+            <a:r>
+              <a:rPr lang="en-US" i="1" dirty="0"/>
+              <a:t>t</a:t>
+            </a:r>
+            <a:r>
+              <a:rPr lang="en-US" i="1" dirty="0" smtClean="0"/>
+              <a:t>he City: Christians as Benefactors and Citizens</a:t>
+            </a:r>
+            <a:r>
+              <a:rPr lang="en-US" dirty="0" smtClean="0"/>
+              <a:t> – Bruce W. Winter</a:t>
+            </a:r>
+            <a:endParaRPr lang="en-US" i="1" dirty="0" smtClean="0"/>
+          </a:p>
+        </p:txBody>
+      </p:sp>
+      <p:sp>
+        <p:nvSpPr>
+          <p:cNvPr id="4" name="Title 3"/>
+          <p:cNvSpPr>
+            <a:spLocks noGrp="1"/>
+          </p:cNvSpPr>
+          <p:nvPr>
+            <p:ph type="title"/>
+          </p:nvPr>
+        </p:nvSpPr>
+        <p:spPr>
+          <a:xfrm>
+            <a:off x="149091" y="5791200"/>
+            <a:ext cx="7543800" cy="914400"/>
+          </a:xfrm>
+        </p:spPr>
+        <p:txBody>
+          <a:bodyPr/>
+          <a:lstStyle/>
+          <a:p>
+            <a:r>
+              <a:rPr lang="en-US" dirty="0" smtClean="0"/>
+              <a:t>References</a:t>
+            </a:r>
+            <a:endParaRPr lang="en-US" dirty="0"/>
+          </a:p>
+        </p:txBody>
+      </p:sp>
+    </p:spTree>
+    <p:extLst>
+      <p:ext uri="{BB962C8B-B14F-4D97-AF65-F5344CB8AC3E}">
+        <p14:creationId xmlns:p14="http://schemas.microsoft.com/office/powerpoint/2010/main" val="530063558"/>
+      </p:ext>
+    </p:extLst>
+  </p:cSld>
+  <p:clrMapOvr>
+    <a:masterClrMapping/>
+  </p:clrMapOvr>
 </p:sld>
 </file>
 
@@ -10130,7 +12574,7 @@
 </file>
 
 <file path=ppt/slides/slide9.xml><?xml version="1.0" encoding="utf-8"?>
-<p:sld xmlns:a="http://schemas.openxmlformats.org/drawingml/2006/main" xmlns:r="http://schemas.openxmlformats.org/officeDocument/2006/relationships" xmlns:p="http://schemas.openxmlformats.org/presentationml/2006/main">
+<p:sld xmlns:a="http://schemas.openxmlformats.org/drawingml/2006/main" xmlns:r="http://schemas.openxmlformats.org/officeDocument/2006/relationships" xmlns:p="http://schemas.openxmlformats.org/presentationml/2006/main" show="0">
   <p:cSld>
     <p:spTree>
       <p:nvGrpSpPr>
@@ -10179,6 +12623,14 @@
   <p:clrMapOvr>
     <a:masterClrMapping/>
   </p:clrMapOvr>
+  <mc:AlternateContent xmlns:mc="http://schemas.openxmlformats.org/markup-compatibility/2006">
+    <mc:Choice xmlns:p14="http://schemas.microsoft.com/office/powerpoint/2010/main" Requires="p14">
+      <p:transition spd="slow" p14:dur="2000"/>
+    </mc:Choice>
+    <mc:Fallback>
+      <p:transition xmlns:p14="http://schemas.microsoft.com/office/powerpoint/2010/main" spd="slow"/>
+    </mc:Fallback>
+  </mc:AlternateContent>
   <p:timing>
     <p:tnLst>
       <p:par>

</xml_diff>